<commit_message>
Fixed race condition bug in TaskPool when starting the next task and the pool has been stopped. Fixed bug in TickGen to display the correct number of decimal places.
</commit_message>
<xml_diff>
--- a/java/JChartLib/docs/ui_framing.pptx
+++ b/java/JChartLib/docs/ui_framing.pptx
@@ -5,7 +5,7 @@
     <p:sldMasterId id="2147483648" r:id="rId1"/>
   </p:sldMasterIdLst>
   <p:notesMasterIdLst>
-    <p:notesMasterId r:id="rId14"/>
+    <p:notesMasterId r:id="rId15"/>
   </p:notesMasterIdLst>
   <p:sldIdLst>
     <p:sldId id="257" r:id="rId2"/>
@@ -20,6 +20,7 @@
     <p:sldId id="267" r:id="rId11"/>
     <p:sldId id="266" r:id="rId12"/>
     <p:sldId id="264" r:id="rId13"/>
+    <p:sldId id="269" r:id="rId14"/>
   </p:sldIdLst>
   <p:sldSz cx="9144000" cy="6858000" type="screen4x3"/>
   <p:notesSz cx="7010400" cy="9296400"/>
@@ -203,7 +204,7 @@
           <a:p>
             <a:fld id="{451F6C7C-57B4-44C2-A879-518E542631BF}" type="datetimeFigureOut">
               <a:rPr lang="en-US" smtClean="0"/>
-              <a:t>7/29/2015</a:t>
+              <a:t>9/24/2015</a:t>
             </a:fld>
             <a:endParaRPr lang="en-US"/>
           </a:p>
@@ -736,7 +737,7 @@
           <a:p>
             <a:fld id="{B3B44F0C-6643-4E85-A7FB-3BB2F8AA78FB}" type="datetime1">
               <a:rPr lang="en-US" smtClean="0"/>
-              <a:t>7/30/2015</a:t>
+              <a:t>9/24/2015</a:t>
             </a:fld>
             <a:endParaRPr lang="en-US"/>
           </a:p>
@@ -919,7 +920,7 @@
           <a:p>
             <a:fld id="{8F5BB2FE-DFCB-4D7F-A08C-F22FECF2C0CD}" type="datetime1">
               <a:rPr lang="en-US" smtClean="0"/>
-              <a:t>7/30/2015</a:t>
+              <a:t>9/24/2015</a:t>
             </a:fld>
             <a:endParaRPr lang="en-US"/>
           </a:p>
@@ -1099,7 +1100,7 @@
           <a:p>
             <a:fld id="{0F45ABAE-FDFC-4E8A-9AEA-00D2AFD8DE8B}" type="datetime1">
               <a:rPr lang="en-US" smtClean="0"/>
-              <a:t>7/30/2015</a:t>
+              <a:t>9/24/2015</a:t>
             </a:fld>
             <a:endParaRPr lang="en-US"/>
           </a:p>
@@ -1269,7 +1270,7 @@
           <a:p>
             <a:fld id="{37163F97-8B7A-4C99-BFC1-3EC5BAD8F465}" type="datetime1">
               <a:rPr lang="en-US" smtClean="0"/>
-              <a:t>7/30/2015</a:t>
+              <a:t>9/24/2015</a:t>
             </a:fld>
             <a:endParaRPr lang="en-US"/>
           </a:p>
@@ -1515,7 +1516,7 @@
           <a:p>
             <a:fld id="{215CA718-9FC9-4CB4-A637-7B18B96432A9}" type="datetime1">
               <a:rPr lang="en-US" smtClean="0"/>
-              <a:t>7/30/2015</a:t>
+              <a:t>9/24/2015</a:t>
             </a:fld>
             <a:endParaRPr lang="en-US"/>
           </a:p>
@@ -1803,7 +1804,7 @@
           <a:p>
             <a:fld id="{02978113-6A0B-4308-BF24-BE3F446DC299}" type="datetime1">
               <a:rPr lang="en-US" smtClean="0"/>
-              <a:t>7/30/2015</a:t>
+              <a:t>9/24/2015</a:t>
             </a:fld>
             <a:endParaRPr lang="en-US"/>
           </a:p>
@@ -2225,7 +2226,7 @@
           <a:p>
             <a:fld id="{30B8CE64-9E95-47EA-AA0B-EDAF22908BEA}" type="datetime1">
               <a:rPr lang="en-US" smtClean="0"/>
-              <a:t>7/30/2015</a:t>
+              <a:t>9/24/2015</a:t>
             </a:fld>
             <a:endParaRPr lang="en-US"/>
           </a:p>
@@ -2353,7 +2354,7 @@
           <a:p>
             <a:fld id="{C05A1361-3B57-4CE1-99E9-6F73D07E7AFD}" type="datetime1">
               <a:rPr lang="en-US" smtClean="0"/>
-              <a:t>7/30/2015</a:t>
+              <a:t>9/24/2015</a:t>
             </a:fld>
             <a:endParaRPr lang="en-US"/>
           </a:p>
@@ -2533,7 +2534,7 @@
           <a:p>
             <a:fld id="{48084879-C730-49C2-9369-4526E7313D15}" type="datetime1">
               <a:rPr lang="en-US" smtClean="0"/>
-              <a:t>7/30/2015</a:t>
+              <a:t>9/24/2015</a:t>
             </a:fld>
             <a:endParaRPr lang="en-US"/>
           </a:p>
@@ -2810,7 +2811,7 @@
           <a:p>
             <a:fld id="{08B42C97-3C78-4F31-BBF5-0836FE73BBF4}" type="datetime1">
               <a:rPr lang="en-US" smtClean="0"/>
-              <a:t>7/30/2015</a:t>
+              <a:t>9/24/2015</a:t>
             </a:fld>
             <a:endParaRPr lang="en-US"/>
           </a:p>
@@ -3063,7 +3064,7 @@
           <a:p>
             <a:fld id="{20BBBBF6-E6AB-4416-A560-6979273157FF}" type="datetime1">
               <a:rPr lang="en-US" smtClean="0"/>
-              <a:t>7/30/2015</a:t>
+              <a:t>9/24/2015</a:t>
             </a:fld>
             <a:endParaRPr lang="en-US"/>
           </a:p>
@@ -3276,7 +3277,7 @@
           <a:p>
             <a:fld id="{BA333682-8707-47CB-92BD-798CEAEF6CB6}" type="datetime1">
               <a:rPr lang="en-US" smtClean="0"/>
-              <a:t>7/30/2015</a:t>
+              <a:t>9/24/2015</a:t>
             </a:fld>
             <a:endParaRPr lang="en-US"/>
           </a:p>
@@ -4718,11 +4719,7 @@
           <a:p>
             <a:r>
               <a:rPr lang="en-US" dirty="0" smtClean="0"/>
-              <a:t>Axis Properties </a:t>
-            </a:r>
-            <a:r>
-              <a:rPr lang="en-US" dirty="0" smtClean="0"/>
-              <a:t>View</a:t>
+              <a:t>Axis Properties View</a:t>
             </a:r>
             <a:endParaRPr lang="en-US" dirty="0"/>
           </a:p>
@@ -7359,11 +7356,7 @@
                 <a:pPr algn="r"/>
                 <a:r>
                   <a:rPr lang="en-US" sz="1200" dirty="0" smtClean="0"/>
-                  <a:t>Size</a:t>
-                </a:r>
-                <a:r>
-                  <a:rPr lang="en-US" sz="1200" dirty="0" smtClean="0"/>
-                  <a:t>:</a:t>
+                  <a:t>Size:</a:t>
                 </a:r>
                 <a:endParaRPr lang="en-US" sz="1200" dirty="0"/>
               </a:p>
@@ -7917,11 +7910,7 @@
                 <a:pPr algn="r"/>
                 <a:r>
                   <a:rPr lang="en-US" sz="1000" dirty="0" smtClean="0"/>
-                  <a:t>Weight</a:t>
-                </a:r>
-                <a:r>
-                  <a:rPr lang="en-US" sz="1000" dirty="0" smtClean="0"/>
-                  <a:t>:</a:t>
+                  <a:t>Weight:</a:t>
                 </a:r>
                 <a:endParaRPr lang="en-US" sz="1000" dirty="0"/>
               </a:p>
@@ -8400,6 +8389,427 @@
 </p:sld>
 </file>
 
+<file path=ppt/slides/slide13.xml><?xml version="1.0" encoding="utf-8"?>
+<p:sld xmlns:a="http://schemas.openxmlformats.org/drawingml/2006/main" xmlns:r="http://schemas.openxmlformats.org/officeDocument/2006/relationships" xmlns:p="http://schemas.openxmlformats.org/presentationml/2006/main">
+  <p:cSld>
+    <p:spTree>
+      <p:nvGrpSpPr>
+        <p:cNvPr id="1" name=""/>
+        <p:cNvGrpSpPr/>
+        <p:nvPr/>
+      </p:nvGrpSpPr>
+      <p:grpSpPr>
+        <a:xfrm>
+          <a:off x="0" y="0"/>
+          <a:ext cx="0" cy="0"/>
+          <a:chOff x="0" y="0"/>
+          <a:chExt cx="0" cy="0"/>
+        </a:xfrm>
+      </p:grpSpPr>
+      <p:sp>
+        <p:nvSpPr>
+          <p:cNvPr id="2" name="Title 1"/>
+          <p:cNvSpPr>
+            <a:spLocks noGrp="1"/>
+          </p:cNvSpPr>
+          <p:nvPr>
+            <p:ph type="title"/>
+          </p:nvPr>
+        </p:nvSpPr>
+        <p:spPr/>
+        <p:txBody>
+          <a:bodyPr>
+            <a:normAutofit fontScale="90000"/>
+          </a:bodyPr>
+          <a:lstStyle/>
+          <a:p>
+            <a:r>
+              <a:rPr lang="en-US" dirty="0" smtClean="0"/>
+              <a:t>Chart Layout</a:t>
+            </a:r>
+            <a:endParaRPr lang="en-US" dirty="0"/>
+          </a:p>
+        </p:txBody>
+      </p:sp>
+      <p:sp>
+        <p:nvSpPr>
+          <p:cNvPr id="3" name="Slide Number Placeholder 2"/>
+          <p:cNvSpPr>
+            <a:spLocks noGrp="1"/>
+          </p:cNvSpPr>
+          <p:nvPr>
+            <p:ph type="sldNum" sz="quarter" idx="12"/>
+          </p:nvPr>
+        </p:nvSpPr>
+        <p:spPr/>
+        <p:txBody>
+          <a:bodyPr/>
+          <a:lstStyle/>
+          <a:p>
+            <a:r>
+              <a:rPr lang="en-US" smtClean="0"/>
+              <a:t>Page </a:t>
+            </a:r>
+            <a:fld id="{F1B1EB98-98E7-4A5A-BA8F-7513A9456E79}" type="slidenum">
+              <a:rPr lang="en-US" smtClean="0"/>
+              <a:pPr/>
+              <a:t>13</a:t>
+            </a:fld>
+            <a:endParaRPr lang="en-US" dirty="0"/>
+          </a:p>
+        </p:txBody>
+      </p:sp>
+      <p:sp>
+        <p:nvSpPr>
+          <p:cNvPr id="4" name="Rectangle 3"/>
+          <p:cNvSpPr/>
+          <p:nvPr/>
+        </p:nvSpPr>
+        <p:spPr>
+          <a:xfrm>
+            <a:off x="2743200" y="1981200"/>
+            <a:ext cx="3733800" cy="3352800"/>
+          </a:xfrm>
+          <a:prstGeom prst="rect">
+            <a:avLst/>
+          </a:prstGeom>
+          <a:solidFill>
+            <a:schemeClr val="bg1"/>
+          </a:solidFill>
+        </p:spPr>
+        <p:style>
+          <a:lnRef idx="2">
+            <a:schemeClr val="accent1">
+              <a:shade val="50000"/>
+            </a:schemeClr>
+          </a:lnRef>
+          <a:fillRef idx="1">
+            <a:schemeClr val="accent1"/>
+          </a:fillRef>
+          <a:effectRef idx="0">
+            <a:schemeClr val="accent1"/>
+          </a:effectRef>
+          <a:fontRef idx="minor">
+            <a:schemeClr val="lt1"/>
+          </a:fontRef>
+        </p:style>
+        <p:txBody>
+          <a:bodyPr rtlCol="0" anchor="ctr"/>
+          <a:lstStyle/>
+          <a:p>
+            <a:pPr algn="ctr"/>
+            <a:r>
+              <a:rPr lang="en-US" dirty="0" smtClean="0">
+                <a:solidFill>
+                  <a:schemeClr val="tx1"/>
+                </a:solidFill>
+              </a:rPr>
+              <a:t>Chart</a:t>
+            </a:r>
+            <a:endParaRPr lang="en-US" dirty="0">
+              <a:solidFill>
+                <a:schemeClr val="tx1"/>
+              </a:solidFill>
+            </a:endParaRPr>
+          </a:p>
+        </p:txBody>
+      </p:sp>
+      <p:sp>
+        <p:nvSpPr>
+          <p:cNvPr id="5" name="Rectangle 4"/>
+          <p:cNvSpPr/>
+          <p:nvPr/>
+        </p:nvSpPr>
+        <p:spPr>
+          <a:xfrm>
+            <a:off x="2743200" y="1981200"/>
+            <a:ext cx="3733800" cy="381000"/>
+          </a:xfrm>
+          <a:prstGeom prst="rect">
+            <a:avLst/>
+          </a:prstGeom>
+          <a:solidFill>
+            <a:schemeClr val="bg1"/>
+          </a:solidFill>
+        </p:spPr>
+        <p:style>
+          <a:lnRef idx="2">
+            <a:schemeClr val="accent1">
+              <a:shade val="50000"/>
+            </a:schemeClr>
+          </a:lnRef>
+          <a:fillRef idx="1">
+            <a:schemeClr val="accent1"/>
+          </a:fillRef>
+          <a:effectRef idx="0">
+            <a:schemeClr val="accent1"/>
+          </a:effectRef>
+          <a:fontRef idx="minor">
+            <a:schemeClr val="lt1"/>
+          </a:fontRef>
+        </p:style>
+        <p:txBody>
+          <a:bodyPr rtlCol="0" anchor="ctr"/>
+          <a:lstStyle/>
+          <a:p>
+            <a:pPr algn="ctr"/>
+            <a:r>
+              <a:rPr lang="en-US" dirty="0" smtClean="0">
+                <a:solidFill>
+                  <a:schemeClr val="tx1"/>
+                </a:solidFill>
+              </a:rPr>
+              <a:t>Secondary Domain Title</a:t>
+            </a:r>
+            <a:endParaRPr lang="en-US" dirty="0">
+              <a:solidFill>
+                <a:schemeClr val="tx1"/>
+              </a:solidFill>
+            </a:endParaRPr>
+          </a:p>
+        </p:txBody>
+      </p:sp>
+      <p:sp>
+        <p:nvSpPr>
+          <p:cNvPr id="6" name="Rectangle 5"/>
+          <p:cNvSpPr/>
+          <p:nvPr/>
+        </p:nvSpPr>
+        <p:spPr>
+          <a:xfrm>
+            <a:off x="2743200" y="4957313"/>
+            <a:ext cx="3733800" cy="381000"/>
+          </a:xfrm>
+          <a:prstGeom prst="rect">
+            <a:avLst/>
+          </a:prstGeom>
+          <a:solidFill>
+            <a:schemeClr val="bg1"/>
+          </a:solidFill>
+        </p:spPr>
+        <p:style>
+          <a:lnRef idx="2">
+            <a:schemeClr val="accent1">
+              <a:shade val="50000"/>
+            </a:schemeClr>
+          </a:lnRef>
+          <a:fillRef idx="1">
+            <a:schemeClr val="accent1"/>
+          </a:fillRef>
+          <a:effectRef idx="0">
+            <a:schemeClr val="accent1"/>
+          </a:effectRef>
+          <a:fontRef idx="minor">
+            <a:schemeClr val="lt1"/>
+          </a:fontRef>
+        </p:style>
+        <p:txBody>
+          <a:bodyPr rtlCol="0" anchor="ctr"/>
+          <a:lstStyle/>
+          <a:p>
+            <a:pPr algn="ctr"/>
+            <a:r>
+              <a:rPr lang="en-US" dirty="0" smtClean="0">
+                <a:solidFill>
+                  <a:schemeClr val="tx1"/>
+                </a:solidFill>
+              </a:rPr>
+              <a:t>Domain </a:t>
+            </a:r>
+            <a:r>
+              <a:rPr lang="en-US" dirty="0" smtClean="0">
+                <a:solidFill>
+                  <a:schemeClr val="tx1"/>
+                </a:solidFill>
+              </a:rPr>
+              <a:t>Title</a:t>
+            </a:r>
+            <a:endParaRPr lang="en-US" dirty="0">
+              <a:solidFill>
+                <a:schemeClr val="tx1"/>
+              </a:solidFill>
+            </a:endParaRPr>
+          </a:p>
+        </p:txBody>
+      </p:sp>
+      <p:sp>
+        <p:nvSpPr>
+          <p:cNvPr id="7" name="Rectangle 6"/>
+          <p:cNvSpPr/>
+          <p:nvPr/>
+        </p:nvSpPr>
+        <p:spPr>
+          <a:xfrm rot="16200000">
+            <a:off x="1636143" y="3469256"/>
+            <a:ext cx="2595113" cy="381000"/>
+          </a:xfrm>
+          <a:prstGeom prst="rect">
+            <a:avLst/>
+          </a:prstGeom>
+          <a:solidFill>
+            <a:schemeClr val="bg1"/>
+          </a:solidFill>
+        </p:spPr>
+        <p:style>
+          <a:lnRef idx="2">
+            <a:schemeClr val="accent1">
+              <a:shade val="50000"/>
+            </a:schemeClr>
+          </a:lnRef>
+          <a:fillRef idx="1">
+            <a:schemeClr val="accent1"/>
+          </a:fillRef>
+          <a:effectRef idx="0">
+            <a:schemeClr val="accent1"/>
+          </a:effectRef>
+          <a:fontRef idx="minor">
+            <a:schemeClr val="lt1"/>
+          </a:fontRef>
+        </p:style>
+        <p:txBody>
+          <a:bodyPr rtlCol="0" anchor="ctr"/>
+          <a:lstStyle/>
+          <a:p>
+            <a:pPr algn="ctr"/>
+            <a:r>
+              <a:rPr lang="en-US" dirty="0" smtClean="0">
+                <a:solidFill>
+                  <a:schemeClr val="tx1"/>
+                </a:solidFill>
+              </a:rPr>
+              <a:t>Range Title</a:t>
+            </a:r>
+            <a:endParaRPr lang="en-US" dirty="0">
+              <a:solidFill>
+                <a:schemeClr val="tx1"/>
+              </a:solidFill>
+            </a:endParaRPr>
+          </a:p>
+        </p:txBody>
+      </p:sp>
+      <p:sp>
+        <p:nvSpPr>
+          <p:cNvPr id="8" name="Rectangle 7"/>
+          <p:cNvSpPr/>
+          <p:nvPr/>
+        </p:nvSpPr>
+        <p:spPr>
+          <a:xfrm rot="16200000">
+            <a:off x="4988943" y="3469257"/>
+            <a:ext cx="2595113" cy="381000"/>
+          </a:xfrm>
+          <a:prstGeom prst="rect">
+            <a:avLst/>
+          </a:prstGeom>
+          <a:solidFill>
+            <a:schemeClr val="bg1"/>
+          </a:solidFill>
+        </p:spPr>
+        <p:style>
+          <a:lnRef idx="2">
+            <a:schemeClr val="accent1">
+              <a:shade val="50000"/>
+            </a:schemeClr>
+          </a:lnRef>
+          <a:fillRef idx="1">
+            <a:schemeClr val="accent1"/>
+          </a:fillRef>
+          <a:effectRef idx="0">
+            <a:schemeClr val="accent1"/>
+          </a:effectRef>
+          <a:fontRef idx="minor">
+            <a:schemeClr val="lt1"/>
+          </a:fontRef>
+        </p:style>
+        <p:txBody>
+          <a:bodyPr rtlCol="0" anchor="ctr"/>
+          <a:lstStyle/>
+          <a:p>
+            <a:pPr algn="ctr"/>
+            <a:r>
+              <a:rPr lang="en-US" dirty="0" smtClean="0">
+                <a:solidFill>
+                  <a:schemeClr val="tx1"/>
+                </a:solidFill>
+              </a:rPr>
+              <a:t>Secondary Range Title</a:t>
+            </a:r>
+            <a:endParaRPr lang="en-US" dirty="0">
+              <a:solidFill>
+                <a:schemeClr val="tx1"/>
+              </a:solidFill>
+            </a:endParaRPr>
+          </a:p>
+        </p:txBody>
+      </p:sp>
+      <p:sp>
+        <p:nvSpPr>
+          <p:cNvPr id="9" name="Rectangle 8"/>
+          <p:cNvSpPr/>
+          <p:nvPr/>
+        </p:nvSpPr>
+        <p:spPr>
+          <a:xfrm>
+            <a:off x="2743200" y="1600200"/>
+            <a:ext cx="3733800" cy="381000"/>
+          </a:xfrm>
+          <a:prstGeom prst="rect">
+            <a:avLst/>
+          </a:prstGeom>
+          <a:solidFill>
+            <a:schemeClr val="bg1"/>
+          </a:solidFill>
+        </p:spPr>
+        <p:style>
+          <a:lnRef idx="2">
+            <a:schemeClr val="accent1">
+              <a:shade val="50000"/>
+            </a:schemeClr>
+          </a:lnRef>
+          <a:fillRef idx="1">
+            <a:schemeClr val="accent1"/>
+          </a:fillRef>
+          <a:effectRef idx="0">
+            <a:schemeClr val="accent1"/>
+          </a:effectRef>
+          <a:fontRef idx="minor">
+            <a:schemeClr val="lt1"/>
+          </a:fontRef>
+        </p:style>
+        <p:txBody>
+          <a:bodyPr rtlCol="0" anchor="ctr"/>
+          <a:lstStyle/>
+          <a:p>
+            <a:pPr algn="ctr"/>
+            <a:r>
+              <a:rPr lang="en-US" dirty="0" smtClean="0">
+                <a:solidFill>
+                  <a:schemeClr val="tx1"/>
+                </a:solidFill>
+              </a:rPr>
+              <a:t>Chart Title</a:t>
+            </a:r>
+            <a:endParaRPr lang="en-US" dirty="0">
+              <a:solidFill>
+                <a:schemeClr val="tx1"/>
+              </a:solidFill>
+            </a:endParaRPr>
+          </a:p>
+        </p:txBody>
+      </p:sp>
+    </p:spTree>
+    <p:extLst>
+      <p:ext uri="{BB962C8B-B14F-4D97-AF65-F5344CB8AC3E}">
+        <p14:creationId xmlns:p14="http://schemas.microsoft.com/office/powerpoint/2010/main" val="477428930"/>
+      </p:ext>
+    </p:extLst>
+  </p:cSld>
+  <p:clrMapOvr>
+    <a:masterClrMapping/>
+  </p:clrMapOvr>
+</p:sld>
+</file>
+
 <file path=ppt/slides/slide2.xml><?xml version="1.0" encoding="utf-8"?>
 <p:sld xmlns:a="http://schemas.openxmlformats.org/drawingml/2006/main" xmlns:r="http://schemas.openxmlformats.org/officeDocument/2006/relationships" xmlns:p="http://schemas.openxmlformats.org/presentationml/2006/main">
   <p:cSld>
@@ -8757,7 +9167,23 @@
                     <a:schemeClr val="tx1"/>
                   </a:solidFill>
                 </a:rPr>
-                <a:t>(3.4,5.677); (5643.3 2.4); </a:t>
+                <a:t>(</a:t>
+              </a:r>
+              <a:r>
+                <a:rPr lang="en-US" sz="1200" smtClean="0">
+                  <a:solidFill>
+                    <a:schemeClr val="tx1"/>
+                  </a:solidFill>
+                </a:rPr>
+                <a:t>3.4</a:t>
+              </a:r>
+              <a:r>
+                <a:rPr lang="en-US" sz="1200" smtClean="0">
+                  <a:solidFill>
+                    <a:schemeClr val="tx1"/>
+                  </a:solidFill>
+                </a:rPr>
+                <a:t>, 5.677</a:t>
               </a:r>
               <a:r>
                 <a:rPr lang="en-US" sz="1200" dirty="0" smtClean="0">
@@ -8765,7 +9191,23 @@
                     <a:schemeClr val="tx1"/>
                   </a:solidFill>
                 </a:rPr>
-                <a:t>Plots </a:t>
+                <a:t>); </a:t>
+              </a:r>
+              <a:r>
+                <a:rPr lang="en-US" sz="1200" smtClean="0">
+                  <a:solidFill>
+                    <a:schemeClr val="tx1"/>
+                  </a:solidFill>
+                </a:rPr>
+                <a:t>(</a:t>
+              </a:r>
+              <a:r>
+                <a:rPr lang="en-US" sz="1200" smtClean="0">
+                  <a:solidFill>
+                    <a:schemeClr val="tx1"/>
+                  </a:solidFill>
+                </a:rPr>
+                <a:t>5643.3, 2.4</a:t>
               </a:r>
               <a:r>
                 <a:rPr lang="en-US" sz="1200" dirty="0" smtClean="0">
@@ -8773,7 +9215,7 @@
                     <a:schemeClr val="tx1"/>
                   </a:solidFill>
                 </a:rPr>
-                <a:t>2 of 2; Size: 400 x 375</a:t>
+                <a:t>); Plots 2 of 2; Size: 400 x 375</a:t>
               </a:r>
               <a:endParaRPr lang="en-US" sz="1200" dirty="0">
                 <a:solidFill>
@@ -11639,11 +12081,7 @@
             </a:r>
             <a:r>
               <a:rPr lang="en-US" dirty="0" smtClean="0"/>
-              <a:t> Properties </a:t>
-            </a:r>
-            <a:r>
-              <a:rPr lang="en-US" dirty="0" smtClean="0"/>
-              <a:t>View</a:t>
+              <a:t> Properties View</a:t>
             </a:r>
             <a:endParaRPr lang="en-US" dirty="0"/>
           </a:p>
@@ -14117,11 +14555,7 @@
           <a:p>
             <a:r>
               <a:rPr lang="en-US" dirty="0" smtClean="0"/>
-              <a:t>Legend Properties </a:t>
-            </a:r>
-            <a:r>
-              <a:rPr lang="en-US" dirty="0" smtClean="0"/>
-              <a:t>View</a:t>
+              <a:t>Legend Properties View</a:t>
             </a:r>
             <a:endParaRPr lang="en-US" dirty="0"/>
           </a:p>

</xml_diff>

<commit_message>
Fixed determination of tick label sizes.
</commit_message>
<xml_diff>
--- a/java/JChartLib/docs/ui_framing.pptx
+++ b/java/JChartLib/docs/ui_framing.pptx
@@ -4330,7 +4330,7 @@
               </p:blipFill>
               <p:spPr bwMode="auto">
                 <a:xfrm>
-                  <a:off x="2121408" y="1670304"/>
+                  <a:off x="1905000" y="1670304"/>
                   <a:ext cx="164592" cy="164592"/>
                 </a:xfrm>
                 <a:prstGeom prst="rect">
@@ -4391,7 +4391,7 @@
             </p:pic>
             <p:pic>
               <p:nvPicPr>
-                <p:cNvPr id="1033" name="Picture 9" descr="C:\Files\jgordon\personal\code\gordoza-code\java\jutils\src\org\jutils\icons\document-export16.png"/>
+                <p:cNvPr id="2051" name="Picture 3" descr="C:\Files\jgordon\personal\code\gordoza-code\java\jutils\src\org\jutils\icons\arrow-left16.png"/>
                 <p:cNvPicPr>
                   <a:picLocks noChangeAspect="1" noChangeArrowheads="1"/>
                 </p:cNvPicPr>
@@ -4412,7 +4412,7 @@
               </p:blipFill>
               <p:spPr bwMode="auto">
                 <a:xfrm>
-                  <a:off x="1828800" y="1670304"/>
+                  <a:off x="2209800" y="1670304"/>
                   <a:ext cx="164592" cy="164592"/>
                 </a:xfrm>
                 <a:prstGeom prst="rect">
@@ -4432,7 +4432,7 @@
             </p:pic>
             <p:pic>
               <p:nvPicPr>
-                <p:cNvPr id="2051" name="Picture 3" descr="C:\Files\jgordon\personal\code\gordoza-code\java\jutils\src\org\jutils\icons\arrow-left16.png"/>
+                <p:cNvPr id="2052" name="Picture 4" descr="C:\Files\jgordon\personal\code\gordoza-code\java\jutils\src\org\jutils\icons\arrow-up16.png"/>
                 <p:cNvPicPr>
                   <a:picLocks noChangeAspect="1" noChangeArrowheads="1"/>
                 </p:cNvPicPr>
@@ -4440,6 +4440,47 @@
               </p:nvPicPr>
               <p:blipFill>
                 <a:blip r:embed="rId5">
+                  <a:extLst>
+                    <a:ext uri="{28A0092B-C50C-407E-A947-70E740481C1C}">
+                      <a14:useLocalDpi xmlns:a14="http://schemas.microsoft.com/office/drawing/2010/main" val="0"/>
+                    </a:ext>
+                  </a:extLst>
+                </a:blip>
+                <a:srcRect/>
+                <a:stretch>
+                  <a:fillRect/>
+                </a:stretch>
+              </p:blipFill>
+              <p:spPr bwMode="auto">
+                <a:xfrm>
+                  <a:off x="2743200" y="1670304"/>
+                  <a:ext cx="164592" cy="164592"/>
+                </a:xfrm>
+                <a:prstGeom prst="rect">
+                  <a:avLst/>
+                </a:prstGeom>
+                <a:noFill/>
+                <a:extLst>
+                  <a:ext uri="{909E8E84-426E-40DD-AFC4-6F175D3DCCD1}">
+                    <a14:hiddenFill xmlns:a14="http://schemas.microsoft.com/office/drawing/2010/main">
+                      <a:solidFill>
+                        <a:srgbClr val="FFFFFF"/>
+                      </a:solidFill>
+                    </a14:hiddenFill>
+                  </a:ext>
+                </a:extLst>
+              </p:spPr>
+            </p:pic>
+            <p:pic>
+              <p:nvPicPr>
+                <p:cNvPr id="2053" name="Picture 5" descr="C:\Files\jgordon\personal\code\gordoza-code\java\jutils\src\org\jutils\icons\arrow-right16.png"/>
+                <p:cNvPicPr>
+                  <a:picLocks noChangeAspect="1" noChangeArrowheads="1"/>
+                </p:cNvPicPr>
+                <p:nvPr/>
+              </p:nvPicPr>
+              <p:blipFill>
+                <a:blip r:embed="rId6">
                   <a:extLst>
                     <a:ext uri="{28A0092B-C50C-407E-A947-70E740481C1C}">
                       <a14:useLocalDpi xmlns:a14="http://schemas.microsoft.com/office/drawing/2010/main" val="0"/>
@@ -4473,48 +4514,7 @@
             </p:pic>
             <p:pic>
               <p:nvPicPr>
-                <p:cNvPr id="2052" name="Picture 4" descr="C:\Files\jgordon\personal\code\gordoza-code\java\jutils\src\org\jutils\icons\arrow-up16.png"/>
-                <p:cNvPicPr>
-                  <a:picLocks noChangeAspect="1" noChangeArrowheads="1"/>
-                </p:cNvPicPr>
-                <p:nvPr/>
-              </p:nvPicPr>
-              <p:blipFill>
-                <a:blip r:embed="rId6">
-                  <a:extLst>
-                    <a:ext uri="{28A0092B-C50C-407E-A947-70E740481C1C}">
-                      <a14:useLocalDpi xmlns:a14="http://schemas.microsoft.com/office/drawing/2010/main" val="0"/>
-                    </a:ext>
-                  </a:extLst>
-                </a:blip>
-                <a:srcRect/>
-                <a:stretch>
-                  <a:fillRect/>
-                </a:stretch>
-              </p:blipFill>
-              <p:spPr bwMode="auto">
-                <a:xfrm>
-                  <a:off x="2959608" y="1670304"/>
-                  <a:ext cx="164592" cy="164592"/>
-                </a:xfrm>
-                <a:prstGeom prst="rect">
-                  <a:avLst/>
-                </a:prstGeom>
-                <a:noFill/>
-                <a:extLst>
-                  <a:ext uri="{909E8E84-426E-40DD-AFC4-6F175D3DCCD1}">
-                    <a14:hiddenFill xmlns:a14="http://schemas.microsoft.com/office/drawing/2010/main">
-                      <a:solidFill>
-                        <a:srgbClr val="FFFFFF"/>
-                      </a:solidFill>
-                    </a14:hiddenFill>
-                  </a:ext>
-                </a:extLst>
-              </p:spPr>
-            </p:pic>
-            <p:pic>
-              <p:nvPicPr>
-                <p:cNvPr id="2053" name="Picture 5" descr="C:\Files\jgordon\personal\code\gordoza-code\java\jutils\src\org\jutils\icons\arrow-right16.png"/>
+                <p:cNvPr id="23" name="Picture 2" descr="C:\Files\jgordon\personal\code\gordoza-code\java\jutils\src\org\jutils\icons\down16.png"/>
                 <p:cNvPicPr>
                   <a:picLocks noChangeAspect="1" noChangeArrowheads="1"/>
                 </p:cNvPicPr>
@@ -4535,48 +4535,7 @@
               </p:blipFill>
               <p:spPr bwMode="auto">
                 <a:xfrm>
-                  <a:off x="2642616" y="1670304"/>
-                  <a:ext cx="164592" cy="164592"/>
-                </a:xfrm>
-                <a:prstGeom prst="rect">
-                  <a:avLst/>
-                </a:prstGeom>
-                <a:noFill/>
-                <a:extLst>
-                  <a:ext uri="{909E8E84-426E-40DD-AFC4-6F175D3DCCD1}">
-                    <a14:hiddenFill xmlns:a14="http://schemas.microsoft.com/office/drawing/2010/main">
-                      <a:solidFill>
-                        <a:srgbClr val="FFFFFF"/>
-                      </a:solidFill>
-                    </a14:hiddenFill>
-                  </a:ext>
-                </a:extLst>
-              </p:spPr>
-            </p:pic>
-            <p:pic>
-              <p:nvPicPr>
-                <p:cNvPr id="23" name="Picture 2" descr="C:\Files\jgordon\personal\code\gordoza-code\java\jutils\src\org\jutils\icons\down16.png"/>
-                <p:cNvPicPr>
-                  <a:picLocks noChangeAspect="1" noChangeArrowheads="1"/>
-                </p:cNvPicPr>
-                <p:nvPr/>
-              </p:nvPicPr>
-              <p:blipFill>
-                <a:blip r:embed="rId8">
-                  <a:extLst>
-                    <a:ext uri="{28A0092B-C50C-407E-A947-70E740481C1C}">
-                      <a14:useLocalDpi xmlns:a14="http://schemas.microsoft.com/office/drawing/2010/main" val="0"/>
-                    </a:ext>
-                  </a:extLst>
-                </a:blip>
-                <a:srcRect/>
-                <a:stretch>
-                  <a:fillRect/>
-                </a:stretch>
-              </p:blipFill>
-              <p:spPr bwMode="auto">
-                <a:xfrm>
-                  <a:off x="3188208" y="1670304"/>
+                  <a:off x="2971800" y="1670304"/>
                   <a:ext cx="164592" cy="164592"/>
                 </a:xfrm>
                 <a:prstGeom prst="rect">
@@ -8614,15 +8573,7 @@
                   <a:schemeClr val="tx1"/>
                 </a:solidFill>
               </a:rPr>
-              <a:t>Domain </a:t>
-            </a:r>
-            <a:r>
-              <a:rPr lang="en-US" dirty="0" smtClean="0">
-                <a:solidFill>
-                  <a:schemeClr val="tx1"/>
-                </a:solidFill>
-              </a:rPr>
-              <a:t>Title</a:t>
+              <a:t>Domain Title</a:t>
             </a:r>
             <a:endParaRPr lang="en-US" dirty="0">
               <a:solidFill>
@@ -8790,6 +8741,483 @@
               <a:t>Chart Title</a:t>
             </a:r>
             <a:endParaRPr lang="en-US" dirty="0">
+              <a:solidFill>
+                <a:schemeClr val="tx1"/>
+              </a:solidFill>
+            </a:endParaRPr>
+          </a:p>
+        </p:txBody>
+      </p:sp>
+      <p:sp>
+        <p:nvSpPr>
+          <p:cNvPr id="10" name="Rectangle 9"/>
+          <p:cNvSpPr/>
+          <p:nvPr/>
+        </p:nvSpPr>
+        <p:spPr>
+          <a:xfrm>
+            <a:off x="3124200" y="4724399"/>
+            <a:ext cx="1066800" cy="232913"/>
+          </a:xfrm>
+          <a:prstGeom prst="rect">
+            <a:avLst/>
+          </a:prstGeom>
+          <a:solidFill>
+            <a:schemeClr val="bg1"/>
+          </a:solidFill>
+        </p:spPr>
+        <p:style>
+          <a:lnRef idx="2">
+            <a:schemeClr val="accent1">
+              <a:shade val="50000"/>
+            </a:schemeClr>
+          </a:lnRef>
+          <a:fillRef idx="1">
+            <a:schemeClr val="accent1"/>
+          </a:fillRef>
+          <a:effectRef idx="0">
+            <a:schemeClr val="accent1"/>
+          </a:effectRef>
+          <a:fontRef idx="minor">
+            <a:schemeClr val="lt1"/>
+          </a:fontRef>
+        </p:style>
+        <p:txBody>
+          <a:bodyPr rtlCol="0" anchor="ctr"/>
+          <a:lstStyle/>
+          <a:p>
+            <a:pPr algn="ctr"/>
+            <a:r>
+              <a:rPr lang="en-US" sz="1200" dirty="0" smtClean="0">
+                <a:solidFill>
+                  <a:schemeClr val="tx1"/>
+                </a:solidFill>
+              </a:rPr>
+              <a:t>min D tick</a:t>
+            </a:r>
+            <a:endParaRPr lang="en-US" sz="1200" dirty="0">
+              <a:solidFill>
+                <a:schemeClr val="tx1"/>
+              </a:solidFill>
+            </a:endParaRPr>
+          </a:p>
+        </p:txBody>
+      </p:sp>
+      <p:sp>
+        <p:nvSpPr>
+          <p:cNvPr id="11" name="Rectangle 10"/>
+          <p:cNvSpPr/>
+          <p:nvPr/>
+        </p:nvSpPr>
+        <p:spPr>
+          <a:xfrm>
+            <a:off x="5029200" y="4717209"/>
+            <a:ext cx="1066800" cy="232913"/>
+          </a:xfrm>
+          <a:prstGeom prst="rect">
+            <a:avLst/>
+          </a:prstGeom>
+          <a:solidFill>
+            <a:schemeClr val="bg1"/>
+          </a:solidFill>
+        </p:spPr>
+        <p:style>
+          <a:lnRef idx="2">
+            <a:schemeClr val="accent1">
+              <a:shade val="50000"/>
+            </a:schemeClr>
+          </a:lnRef>
+          <a:fillRef idx="1">
+            <a:schemeClr val="accent1"/>
+          </a:fillRef>
+          <a:effectRef idx="0">
+            <a:schemeClr val="accent1"/>
+          </a:effectRef>
+          <a:fontRef idx="minor">
+            <a:schemeClr val="lt1"/>
+          </a:fontRef>
+        </p:style>
+        <p:txBody>
+          <a:bodyPr rtlCol="0" anchor="ctr"/>
+          <a:lstStyle/>
+          <a:p>
+            <a:pPr algn="ctr"/>
+            <a:r>
+              <a:rPr lang="en-US" sz="1200" dirty="0" smtClean="0">
+                <a:solidFill>
+                  <a:schemeClr val="tx1"/>
+                </a:solidFill>
+              </a:rPr>
+              <a:t>max D tick</a:t>
+            </a:r>
+            <a:endParaRPr lang="en-US" sz="1200" dirty="0">
+              <a:solidFill>
+                <a:schemeClr val="tx1"/>
+              </a:solidFill>
+            </a:endParaRPr>
+          </a:p>
+        </p:txBody>
+      </p:sp>
+      <p:sp>
+        <p:nvSpPr>
+          <p:cNvPr id="12" name="Rectangle 11"/>
+          <p:cNvSpPr/>
+          <p:nvPr/>
+        </p:nvSpPr>
+        <p:spPr>
+          <a:xfrm>
+            <a:off x="3124200" y="2362200"/>
+            <a:ext cx="1066800" cy="232913"/>
+          </a:xfrm>
+          <a:prstGeom prst="rect">
+            <a:avLst/>
+          </a:prstGeom>
+          <a:solidFill>
+            <a:schemeClr val="bg1"/>
+          </a:solidFill>
+        </p:spPr>
+        <p:style>
+          <a:lnRef idx="2">
+            <a:schemeClr val="accent1">
+              <a:shade val="50000"/>
+            </a:schemeClr>
+          </a:lnRef>
+          <a:fillRef idx="1">
+            <a:schemeClr val="accent1"/>
+          </a:fillRef>
+          <a:effectRef idx="0">
+            <a:schemeClr val="accent1"/>
+          </a:effectRef>
+          <a:fontRef idx="minor">
+            <a:schemeClr val="lt1"/>
+          </a:fontRef>
+        </p:style>
+        <p:txBody>
+          <a:bodyPr rtlCol="0" anchor="ctr"/>
+          <a:lstStyle/>
+          <a:p>
+            <a:pPr algn="ctr"/>
+            <a:r>
+              <a:rPr lang="en-US" sz="1200" dirty="0" smtClean="0">
+                <a:solidFill>
+                  <a:schemeClr val="tx1"/>
+                </a:solidFill>
+              </a:rPr>
+              <a:t>min SD tick</a:t>
+            </a:r>
+            <a:endParaRPr lang="en-US" sz="1200" dirty="0">
+              <a:solidFill>
+                <a:schemeClr val="tx1"/>
+              </a:solidFill>
+            </a:endParaRPr>
+          </a:p>
+        </p:txBody>
+      </p:sp>
+      <p:sp>
+        <p:nvSpPr>
+          <p:cNvPr id="13" name="Rectangle 12"/>
+          <p:cNvSpPr/>
+          <p:nvPr/>
+        </p:nvSpPr>
+        <p:spPr>
+          <a:xfrm>
+            <a:off x="4953000" y="2362200"/>
+            <a:ext cx="1143000" cy="232913"/>
+          </a:xfrm>
+          <a:prstGeom prst="rect">
+            <a:avLst/>
+          </a:prstGeom>
+          <a:solidFill>
+            <a:schemeClr val="bg1"/>
+          </a:solidFill>
+        </p:spPr>
+        <p:style>
+          <a:lnRef idx="2">
+            <a:schemeClr val="accent1">
+              <a:shade val="50000"/>
+            </a:schemeClr>
+          </a:lnRef>
+          <a:fillRef idx="1">
+            <a:schemeClr val="accent1"/>
+          </a:fillRef>
+          <a:effectRef idx="0">
+            <a:schemeClr val="accent1"/>
+          </a:effectRef>
+          <a:fontRef idx="minor">
+            <a:schemeClr val="lt1"/>
+          </a:fontRef>
+        </p:style>
+        <p:txBody>
+          <a:bodyPr rtlCol="0" anchor="ctr"/>
+          <a:lstStyle/>
+          <a:p>
+            <a:pPr algn="ctr"/>
+            <a:r>
+              <a:rPr lang="en-US" sz="1200" dirty="0" smtClean="0">
+                <a:solidFill>
+                  <a:schemeClr val="tx1"/>
+                </a:solidFill>
+              </a:rPr>
+              <a:t>max SD tick</a:t>
+            </a:r>
+            <a:endParaRPr lang="en-US" sz="1200" dirty="0">
+              <a:solidFill>
+                <a:schemeClr val="tx1"/>
+              </a:solidFill>
+            </a:endParaRPr>
+          </a:p>
+        </p:txBody>
+      </p:sp>
+      <p:sp>
+        <p:nvSpPr>
+          <p:cNvPr id="14" name="Rectangle 13"/>
+          <p:cNvSpPr/>
+          <p:nvPr/>
+        </p:nvSpPr>
+        <p:spPr>
+          <a:xfrm>
+            <a:off x="3810000" y="2595113"/>
+            <a:ext cx="1600200" cy="2122096"/>
+          </a:xfrm>
+          <a:prstGeom prst="rect">
+            <a:avLst/>
+          </a:prstGeom>
+          <a:noFill/>
+        </p:spPr>
+        <p:style>
+          <a:lnRef idx="2">
+            <a:schemeClr val="accent1">
+              <a:shade val="50000"/>
+            </a:schemeClr>
+          </a:lnRef>
+          <a:fillRef idx="1">
+            <a:schemeClr val="accent1"/>
+          </a:fillRef>
+          <a:effectRef idx="0">
+            <a:schemeClr val="accent1"/>
+          </a:effectRef>
+          <a:fontRef idx="minor">
+            <a:schemeClr val="lt1"/>
+          </a:fontRef>
+        </p:style>
+        <p:txBody>
+          <a:bodyPr rtlCol="0" anchor="ctr"/>
+          <a:lstStyle/>
+          <a:p>
+            <a:pPr algn="ctr"/>
+            <a:endParaRPr lang="en-US" dirty="0">
+              <a:solidFill>
+                <a:schemeClr val="tx1"/>
+              </a:solidFill>
+            </a:endParaRPr>
+          </a:p>
+        </p:txBody>
+      </p:sp>
+      <p:sp>
+        <p:nvSpPr>
+          <p:cNvPr id="15" name="Rectangle 14"/>
+          <p:cNvSpPr/>
+          <p:nvPr/>
+        </p:nvSpPr>
+        <p:spPr>
+          <a:xfrm>
+            <a:off x="3124200" y="4419599"/>
+            <a:ext cx="685800" cy="381001"/>
+          </a:xfrm>
+          <a:prstGeom prst="rect">
+            <a:avLst/>
+          </a:prstGeom>
+          <a:noFill/>
+        </p:spPr>
+        <p:style>
+          <a:lnRef idx="2">
+            <a:schemeClr val="accent1">
+              <a:shade val="50000"/>
+            </a:schemeClr>
+          </a:lnRef>
+          <a:fillRef idx="1">
+            <a:schemeClr val="accent1"/>
+          </a:fillRef>
+          <a:effectRef idx="0">
+            <a:schemeClr val="accent1"/>
+          </a:effectRef>
+          <a:fontRef idx="minor">
+            <a:schemeClr val="lt1"/>
+          </a:fontRef>
+        </p:style>
+        <p:txBody>
+          <a:bodyPr rtlCol="0" anchor="ctr"/>
+          <a:lstStyle/>
+          <a:p>
+            <a:pPr algn="ctr"/>
+            <a:r>
+              <a:rPr lang="en-US" sz="1200" dirty="0" smtClean="0">
+                <a:solidFill>
+                  <a:schemeClr val="tx1"/>
+                </a:solidFill>
+              </a:rPr>
+              <a:t>min R tick</a:t>
+            </a:r>
+            <a:endParaRPr lang="en-US" sz="1200" dirty="0">
+              <a:solidFill>
+                <a:schemeClr val="tx1"/>
+              </a:solidFill>
+            </a:endParaRPr>
+          </a:p>
+        </p:txBody>
+      </p:sp>
+      <p:sp>
+        <p:nvSpPr>
+          <p:cNvPr id="16" name="Rectangle 15"/>
+          <p:cNvSpPr/>
+          <p:nvPr/>
+        </p:nvSpPr>
+        <p:spPr>
+          <a:xfrm>
+            <a:off x="3124200" y="2514599"/>
+            <a:ext cx="685800" cy="381001"/>
+          </a:xfrm>
+          <a:prstGeom prst="rect">
+            <a:avLst/>
+          </a:prstGeom>
+          <a:noFill/>
+        </p:spPr>
+        <p:style>
+          <a:lnRef idx="2">
+            <a:schemeClr val="accent1">
+              <a:shade val="50000"/>
+            </a:schemeClr>
+          </a:lnRef>
+          <a:fillRef idx="1">
+            <a:schemeClr val="accent1"/>
+          </a:fillRef>
+          <a:effectRef idx="0">
+            <a:schemeClr val="accent1"/>
+          </a:effectRef>
+          <a:fontRef idx="minor">
+            <a:schemeClr val="lt1"/>
+          </a:fontRef>
+        </p:style>
+        <p:txBody>
+          <a:bodyPr rtlCol="0" anchor="ctr"/>
+          <a:lstStyle/>
+          <a:p>
+            <a:pPr algn="ctr"/>
+            <a:r>
+              <a:rPr lang="en-US" sz="1200" dirty="0" smtClean="0">
+                <a:solidFill>
+                  <a:schemeClr val="tx1"/>
+                </a:solidFill>
+              </a:rPr>
+              <a:t>max R tick</a:t>
+            </a:r>
+            <a:endParaRPr lang="en-US" sz="1200" dirty="0">
+              <a:solidFill>
+                <a:schemeClr val="tx1"/>
+              </a:solidFill>
+            </a:endParaRPr>
+          </a:p>
+        </p:txBody>
+      </p:sp>
+      <p:sp>
+        <p:nvSpPr>
+          <p:cNvPr id="17" name="Rectangle 16"/>
+          <p:cNvSpPr/>
+          <p:nvPr/>
+        </p:nvSpPr>
+        <p:spPr>
+          <a:xfrm>
+            <a:off x="5410200" y="4419599"/>
+            <a:ext cx="685800" cy="381001"/>
+          </a:xfrm>
+          <a:prstGeom prst="rect">
+            <a:avLst/>
+          </a:prstGeom>
+          <a:noFill/>
+        </p:spPr>
+        <p:style>
+          <a:lnRef idx="2">
+            <a:schemeClr val="accent1">
+              <a:shade val="50000"/>
+            </a:schemeClr>
+          </a:lnRef>
+          <a:fillRef idx="1">
+            <a:schemeClr val="accent1"/>
+          </a:fillRef>
+          <a:effectRef idx="0">
+            <a:schemeClr val="accent1"/>
+          </a:effectRef>
+          <a:fontRef idx="minor">
+            <a:schemeClr val="lt1"/>
+          </a:fontRef>
+        </p:style>
+        <p:txBody>
+          <a:bodyPr rtlCol="0" anchor="ctr"/>
+          <a:lstStyle/>
+          <a:p>
+            <a:pPr algn="ctr"/>
+            <a:r>
+              <a:rPr lang="en-US" sz="1200" dirty="0" smtClean="0">
+                <a:solidFill>
+                  <a:schemeClr val="tx1"/>
+                </a:solidFill>
+              </a:rPr>
+              <a:t>min SR tick</a:t>
+            </a:r>
+            <a:endParaRPr lang="en-US" sz="1200" dirty="0">
+              <a:solidFill>
+                <a:schemeClr val="tx1"/>
+              </a:solidFill>
+            </a:endParaRPr>
+          </a:p>
+        </p:txBody>
+      </p:sp>
+      <p:sp>
+        <p:nvSpPr>
+          <p:cNvPr id="18" name="Rectangle 17"/>
+          <p:cNvSpPr/>
+          <p:nvPr/>
+        </p:nvSpPr>
+        <p:spPr>
+          <a:xfrm>
+            <a:off x="5410200" y="2514599"/>
+            <a:ext cx="685800" cy="381001"/>
+          </a:xfrm>
+          <a:prstGeom prst="rect">
+            <a:avLst/>
+          </a:prstGeom>
+          <a:noFill/>
+        </p:spPr>
+        <p:style>
+          <a:lnRef idx="2">
+            <a:schemeClr val="accent1">
+              <a:shade val="50000"/>
+            </a:schemeClr>
+          </a:lnRef>
+          <a:fillRef idx="1">
+            <a:schemeClr val="accent1"/>
+          </a:fillRef>
+          <a:effectRef idx="0">
+            <a:schemeClr val="accent1"/>
+          </a:effectRef>
+          <a:fontRef idx="minor">
+            <a:schemeClr val="lt1"/>
+          </a:fontRef>
+        </p:style>
+        <p:txBody>
+          <a:bodyPr rtlCol="0" anchor="ctr"/>
+          <a:lstStyle/>
+          <a:p>
+            <a:pPr algn="ctr"/>
+            <a:r>
+              <a:rPr lang="en-US" sz="1200" dirty="0" smtClean="0">
+                <a:solidFill>
+                  <a:schemeClr val="tx1"/>
+                </a:solidFill>
+              </a:rPr>
+              <a:t>max SR tick</a:t>
+            </a:r>
+            <a:endParaRPr lang="en-US" sz="1200" dirty="0">
               <a:solidFill>
                 <a:schemeClr val="tx1"/>
               </a:solidFill>
@@ -8980,7 +9408,7 @@
             </p:blipFill>
             <p:spPr bwMode="auto">
               <a:xfrm>
-                <a:off x="3962400" y="1976438"/>
+                <a:off x="3973703" y="1976438"/>
                 <a:ext cx="161925" cy="161925"/>
               </a:xfrm>
               <a:prstGeom prst="rect">
@@ -9021,7 +9449,7 @@
             </p:blipFill>
             <p:spPr bwMode="auto">
               <a:xfrm>
-                <a:off x="4267200" y="1981200"/>
+                <a:off x="4507103" y="1981200"/>
                 <a:ext cx="152400" cy="152400"/>
               </a:xfrm>
               <a:prstGeom prst="rect">
@@ -9062,7 +9490,7 @@
             </p:blipFill>
             <p:spPr bwMode="auto">
               <a:xfrm>
-                <a:off x="4810950" y="1975104"/>
+                <a:off x="5050853" y="1975104"/>
                 <a:ext cx="164592" cy="164592"/>
               </a:xfrm>
               <a:prstGeom prst="rect">
@@ -9103,7 +9531,7 @@
             </p:blipFill>
             <p:spPr bwMode="auto">
               <a:xfrm>
-                <a:off x="4572000" y="1975104"/>
+                <a:off x="4811903" y="1975104"/>
                 <a:ext cx="164592" cy="164592"/>
               </a:xfrm>
               <a:prstGeom prst="rect">
@@ -9175,15 +9603,7 @@
                     <a:schemeClr val="tx1"/>
                   </a:solidFill>
                 </a:rPr>
-                <a:t>3.4</a:t>
-              </a:r>
-              <a:r>
-                <a:rPr lang="en-US" sz="1200" smtClean="0">
-                  <a:solidFill>
-                    <a:schemeClr val="tx1"/>
-                  </a:solidFill>
-                </a:rPr>
-                <a:t>, 5.677</a:t>
+                <a:t>3.4, 5.677</a:t>
               </a:r>
               <a:r>
                 <a:rPr lang="en-US" sz="1200" dirty="0" smtClean="0">
@@ -9199,15 +9619,7 @@
                     <a:schemeClr val="tx1"/>
                   </a:solidFill>
                 </a:rPr>
-                <a:t>(</a:t>
-              </a:r>
-              <a:r>
-                <a:rPr lang="en-US" sz="1200" smtClean="0">
-                  <a:solidFill>
-                    <a:schemeClr val="tx1"/>
-                  </a:solidFill>
-                </a:rPr>
-                <a:t>5643.3, 2.4</a:t>
+                <a:t>(5643.3, 2.4</a:t>
               </a:r>
               <a:r>
                 <a:rPr lang="en-US" sz="1200" dirty="0" smtClean="0">
@@ -9279,6 +9691,47 @@
           </a:p>
         </p:txBody>
       </p:sp>
+      <p:pic>
+        <p:nvPicPr>
+          <p:cNvPr id="14" name="Picture 9" descr="C:\Files\jgordon\personal\code\gordoza-code\java\jutils\src\org\jutils\icons\document-export16.png"/>
+          <p:cNvPicPr>
+            <a:picLocks noChangeAspect="1" noChangeArrowheads="1"/>
+          </p:cNvPicPr>
+          <p:nvPr/>
+        </p:nvPicPr>
+        <p:blipFill>
+          <a:blip r:embed="rId6">
+            <a:extLst>
+              <a:ext uri="{28A0092B-C50C-407E-A947-70E740481C1C}">
+                <a14:useLocalDpi xmlns:a14="http://schemas.microsoft.com/office/drawing/2010/main" val="0"/>
+              </a:ext>
+            </a:extLst>
+          </a:blip>
+          <a:srcRect/>
+          <a:stretch>
+            <a:fillRect/>
+          </a:stretch>
+        </p:blipFill>
+        <p:spPr bwMode="auto">
+          <a:xfrm>
+            <a:off x="3035808" y="2045208"/>
+            <a:ext cx="164592" cy="164592"/>
+          </a:xfrm>
+          <a:prstGeom prst="rect">
+            <a:avLst/>
+          </a:prstGeom>
+          <a:noFill/>
+          <a:extLst>
+            <a:ext uri="{909E8E84-426E-40DD-AFC4-6F175D3DCCD1}">
+              <a14:hiddenFill xmlns:a14="http://schemas.microsoft.com/office/drawing/2010/main">
+                <a:solidFill>
+                  <a:srgbClr val="FFFFFF"/>
+                </a:solidFill>
+              </a14:hiddenFill>
+            </a:ext>
+          </a:extLst>
+        </p:spPr>
+      </p:pic>
     </p:spTree>
     <p:extLst>
       <p:ext uri="{BB962C8B-B14F-4D97-AF65-F5344CB8AC3E}">

</xml_diff>

<commit_message>
Fixed non-atomic nature of tick calculation.
</commit_message>
<xml_diff>
--- a/java/JChartLib/docs/ui_framing.pptx
+++ b/java/JChartLib/docs/ui_framing.pptx
@@ -204,7 +204,7 @@
           <a:p>
             <a:fld id="{451F6C7C-57B4-44C2-A879-518E542631BF}" type="datetimeFigureOut">
               <a:rPr lang="en-US" smtClean="0"/>
-              <a:t>9/24/2015</a:t>
+              <a:t>10/8/2015</a:t>
             </a:fld>
             <a:endParaRPr lang="en-US"/>
           </a:p>
@@ -737,7 +737,7 @@
           <a:p>
             <a:fld id="{B3B44F0C-6643-4E85-A7FB-3BB2F8AA78FB}" type="datetime1">
               <a:rPr lang="en-US" smtClean="0"/>
-              <a:t>9/24/2015</a:t>
+              <a:t>10/8/2015</a:t>
             </a:fld>
             <a:endParaRPr lang="en-US"/>
           </a:p>
@@ -920,7 +920,7 @@
           <a:p>
             <a:fld id="{8F5BB2FE-DFCB-4D7F-A08C-F22FECF2C0CD}" type="datetime1">
               <a:rPr lang="en-US" smtClean="0"/>
-              <a:t>9/24/2015</a:t>
+              <a:t>10/8/2015</a:t>
             </a:fld>
             <a:endParaRPr lang="en-US"/>
           </a:p>
@@ -1100,7 +1100,7 @@
           <a:p>
             <a:fld id="{0F45ABAE-FDFC-4E8A-9AEA-00D2AFD8DE8B}" type="datetime1">
               <a:rPr lang="en-US" smtClean="0"/>
-              <a:t>9/24/2015</a:t>
+              <a:t>10/8/2015</a:t>
             </a:fld>
             <a:endParaRPr lang="en-US"/>
           </a:p>
@@ -1270,7 +1270,7 @@
           <a:p>
             <a:fld id="{37163F97-8B7A-4C99-BFC1-3EC5BAD8F465}" type="datetime1">
               <a:rPr lang="en-US" smtClean="0"/>
-              <a:t>9/24/2015</a:t>
+              <a:t>10/8/2015</a:t>
             </a:fld>
             <a:endParaRPr lang="en-US"/>
           </a:p>
@@ -1516,7 +1516,7 @@
           <a:p>
             <a:fld id="{215CA718-9FC9-4CB4-A637-7B18B96432A9}" type="datetime1">
               <a:rPr lang="en-US" smtClean="0"/>
-              <a:t>9/24/2015</a:t>
+              <a:t>10/8/2015</a:t>
             </a:fld>
             <a:endParaRPr lang="en-US"/>
           </a:p>
@@ -1804,7 +1804,7 @@
           <a:p>
             <a:fld id="{02978113-6A0B-4308-BF24-BE3F446DC299}" type="datetime1">
               <a:rPr lang="en-US" smtClean="0"/>
-              <a:t>9/24/2015</a:t>
+              <a:t>10/8/2015</a:t>
             </a:fld>
             <a:endParaRPr lang="en-US"/>
           </a:p>
@@ -2226,7 +2226,7 @@
           <a:p>
             <a:fld id="{30B8CE64-9E95-47EA-AA0B-EDAF22908BEA}" type="datetime1">
               <a:rPr lang="en-US" smtClean="0"/>
-              <a:t>9/24/2015</a:t>
+              <a:t>10/8/2015</a:t>
             </a:fld>
             <a:endParaRPr lang="en-US"/>
           </a:p>
@@ -2354,7 +2354,7 @@
           <a:p>
             <a:fld id="{C05A1361-3B57-4CE1-99E9-6F73D07E7AFD}" type="datetime1">
               <a:rPr lang="en-US" smtClean="0"/>
-              <a:t>9/24/2015</a:t>
+              <a:t>10/8/2015</a:t>
             </a:fld>
             <a:endParaRPr lang="en-US"/>
           </a:p>
@@ -2534,7 +2534,7 @@
           <a:p>
             <a:fld id="{48084879-C730-49C2-9369-4526E7313D15}" type="datetime1">
               <a:rPr lang="en-US" smtClean="0"/>
-              <a:t>9/24/2015</a:t>
+              <a:t>10/8/2015</a:t>
             </a:fld>
             <a:endParaRPr lang="en-US"/>
           </a:p>
@@ -2811,7 +2811,7 @@
           <a:p>
             <a:fld id="{08B42C97-3C78-4F31-BBF5-0836FE73BBF4}" type="datetime1">
               <a:rPr lang="en-US" smtClean="0"/>
-              <a:t>9/24/2015</a:t>
+              <a:t>10/8/2015</a:t>
             </a:fld>
             <a:endParaRPr lang="en-US"/>
           </a:p>
@@ -3064,7 +3064,7 @@
           <a:p>
             <a:fld id="{20BBBBF6-E6AB-4416-A560-6979273157FF}" type="datetime1">
               <a:rPr lang="en-US" smtClean="0"/>
-              <a:t>9/24/2015</a:t>
+              <a:t>10/8/2015</a:t>
             </a:fld>
             <a:endParaRPr lang="en-US"/>
           </a:p>
@@ -3277,7 +3277,7 @@
           <a:p>
             <a:fld id="{BA333682-8707-47CB-92BD-798CEAEF6CB6}" type="datetime1">
               <a:rPr lang="en-US" smtClean="0"/>
-              <a:t>9/24/2015</a:t>
+              <a:t>10/8/2015</a:t>
             </a:fld>
             <a:endParaRPr lang="en-US"/>
           </a:p>
@@ -8487,9 +8487,7 @@
           <a:prstGeom prst="rect">
             <a:avLst/>
           </a:prstGeom>
-          <a:solidFill>
-            <a:schemeClr val="bg1"/>
-          </a:solidFill>
+          <a:noFill/>
         </p:spPr>
         <p:style>
           <a:lnRef idx="2">
@@ -8536,15 +8534,13 @@
         </p:nvSpPr>
         <p:spPr>
           <a:xfrm>
-            <a:off x="2743200" y="4957313"/>
+            <a:off x="2743200" y="4953000"/>
             <a:ext cx="3733800" cy="381000"/>
           </a:xfrm>
           <a:prstGeom prst="rect">
             <a:avLst/>
           </a:prstGeom>
-          <a:solidFill>
-            <a:schemeClr val="bg1"/>
-          </a:solidFill>
+          <a:noFill/>
         </p:spPr>
         <p:style>
           <a:lnRef idx="2">
@@ -8591,15 +8587,13 @@
         </p:nvSpPr>
         <p:spPr>
           <a:xfrm rot="16200000">
-            <a:off x="1636143" y="3469256"/>
-            <a:ext cx="2595113" cy="381000"/>
+            <a:off x="1255143" y="3464943"/>
+            <a:ext cx="3357113" cy="381000"/>
           </a:xfrm>
           <a:prstGeom prst="rect">
             <a:avLst/>
           </a:prstGeom>
-          <a:solidFill>
-            <a:schemeClr val="bg1"/>
-          </a:solidFill>
+          <a:noFill/>
         </p:spPr>
         <p:style>
           <a:lnRef idx="2">
@@ -8646,15 +8640,13 @@
         </p:nvSpPr>
         <p:spPr>
           <a:xfrm rot="16200000">
-            <a:off x="4988943" y="3469257"/>
-            <a:ext cx="2595113" cy="381000"/>
+            <a:off x="4610100" y="3467100"/>
+            <a:ext cx="3352800" cy="381000"/>
           </a:xfrm>
           <a:prstGeom prst="rect">
             <a:avLst/>
           </a:prstGeom>
-          <a:solidFill>
-            <a:schemeClr val="bg1"/>
-          </a:solidFill>
+          <a:noFill/>
         </p:spPr>
         <p:style>
           <a:lnRef idx="2">

</xml_diff>

<commit_message>
Added Layer2dApp to better understand Java2D drawing functions.
</commit_message>
<xml_diff>
--- a/java/JChartLib/docs/ui_framing.pptx
+++ b/java/JChartLib/docs/ui_framing.pptx
@@ -5,7 +5,7 @@
     <p:sldMasterId id="2147483660" r:id="rId1"/>
   </p:sldMasterIdLst>
   <p:notesMasterIdLst>
-    <p:notesMasterId r:id="rId18"/>
+    <p:notesMasterId r:id="rId19"/>
   </p:notesMasterIdLst>
   <p:sldIdLst>
     <p:sldId id="270" r:id="rId2"/>
@@ -24,6 +24,7 @@
     <p:sldId id="264" r:id="rId15"/>
     <p:sldId id="269" r:id="rId16"/>
     <p:sldId id="271" r:id="rId17"/>
+    <p:sldId id="273" r:id="rId18"/>
   </p:sldIdLst>
   <p:sldSz cx="9144000" cy="6858000" type="screen4x3"/>
   <p:notesSz cx="7010400" cy="9296400"/>
@@ -207,7 +208,7 @@
           <a:p>
             <a:fld id="{451F6C7C-57B4-44C2-A879-518E542631BF}" type="datetimeFigureOut">
               <a:rPr lang="en-US" smtClean="0"/>
-              <a:t>2/27/2016</a:t>
+              <a:t>4/27/2016</a:t>
             </a:fld>
             <a:endParaRPr lang="en-US"/>
           </a:p>
@@ -740,7 +741,7 @@
           <a:p>
             <a:fld id="{7589139F-201B-47CA-A8A9-C8F47DFCF43B}" type="datetime1">
               <a:rPr lang="en-US" smtClean="0"/>
-              <a:t>2/27/2016</a:t>
+              <a:t>4/27/2016</a:t>
             </a:fld>
             <a:endParaRPr lang="en-US"/>
           </a:p>
@@ -920,7 +921,7 @@
           <a:p>
             <a:fld id="{39F8E332-08CA-426A-957F-5073818DEA06}" type="datetime1">
               <a:rPr lang="en-US" smtClean="0"/>
-              <a:t>2/27/2016</a:t>
+              <a:t>4/27/2016</a:t>
             </a:fld>
             <a:endParaRPr lang="en-US"/>
           </a:p>
@@ -1100,7 +1101,7 @@
           <a:p>
             <a:fld id="{1CCEE4AD-4EA4-4EE5-AB4F-5727B68DCDDB}" type="datetime1">
               <a:rPr lang="en-US" smtClean="0"/>
-              <a:t>2/27/2016</a:t>
+              <a:t>4/27/2016</a:t>
             </a:fld>
             <a:endParaRPr lang="en-US"/>
           </a:p>
@@ -1275,7 +1276,7 @@
           <a:p>
             <a:fld id="{74C45312-5D5A-413C-811E-51CC413D3FC7}" type="datetime1">
               <a:rPr lang="en-US" smtClean="0"/>
-              <a:t>2/27/2016</a:t>
+              <a:t>4/27/2016</a:t>
             </a:fld>
             <a:endParaRPr lang="en-US"/>
           </a:p>
@@ -1521,7 +1522,7 @@
           <a:p>
             <a:fld id="{443CEAA5-5CF4-4D08-9BB9-7D50715E21F2}" type="datetime1">
               <a:rPr lang="en-US" smtClean="0"/>
-              <a:t>2/27/2016</a:t>
+              <a:t>4/27/2016</a:t>
             </a:fld>
             <a:endParaRPr lang="en-US"/>
           </a:p>
@@ -1809,7 +1810,7 @@
           <a:p>
             <a:fld id="{B44EE941-BE00-4788-B7E8-C0AE4E10A9BF}" type="datetime1">
               <a:rPr lang="en-US" smtClean="0"/>
-              <a:t>2/27/2016</a:t>
+              <a:t>4/27/2016</a:t>
             </a:fld>
             <a:endParaRPr lang="en-US"/>
           </a:p>
@@ -2231,7 +2232,7 @@
           <a:p>
             <a:fld id="{CC540818-E0A3-45A0-B9E7-AB6964DB0AF7}" type="datetime1">
               <a:rPr lang="en-US" smtClean="0"/>
-              <a:t>2/27/2016</a:t>
+              <a:t>4/27/2016</a:t>
             </a:fld>
             <a:endParaRPr lang="en-US"/>
           </a:p>
@@ -2359,7 +2360,7 @@
           <a:p>
             <a:fld id="{107CA5CF-55FE-49DC-B3AC-623F4967B212}" type="datetime1">
               <a:rPr lang="en-US" smtClean="0"/>
-              <a:t>2/27/2016</a:t>
+              <a:t>4/27/2016</a:t>
             </a:fld>
             <a:endParaRPr lang="en-US"/>
           </a:p>
@@ -2469,7 +2470,7 @@
           <a:p>
             <a:fld id="{9C960BAF-EAC5-4B4A-B3FA-08DE80CD43DF}" type="datetime1">
               <a:rPr lang="en-US" smtClean="0"/>
-              <a:t>2/27/2016</a:t>
+              <a:t>4/27/2016</a:t>
             </a:fld>
             <a:endParaRPr lang="en-US"/>
           </a:p>
@@ -2751,7 +2752,7 @@
           <a:p>
             <a:fld id="{54F98608-D36E-481B-A2F2-5C486B7C18F6}" type="datetime1">
               <a:rPr lang="en-US" smtClean="0"/>
-              <a:t>2/27/2016</a:t>
+              <a:t>4/27/2016</a:t>
             </a:fld>
             <a:endParaRPr lang="en-US"/>
           </a:p>
@@ -3009,7 +3010,7 @@
           <a:p>
             <a:fld id="{726042FF-C265-4686-B492-9503F312B9F7}" type="datetime1">
               <a:rPr lang="en-US" smtClean="0"/>
-              <a:t>2/27/2016</a:t>
+              <a:t>4/27/2016</a:t>
             </a:fld>
             <a:endParaRPr lang="en-US"/>
           </a:p>
@@ -3222,7 +3223,7 @@
           <a:p>
             <a:fld id="{CACDD5D5-767C-4EE7-8E36-1049EE603D55}" type="datetime1">
               <a:rPr lang="en-US" smtClean="0"/>
-              <a:t>2/27/2016</a:t>
+              <a:t>4/27/2016</a:t>
             </a:fld>
             <a:endParaRPr lang="en-US"/>
           </a:p>
@@ -10055,6 +10056,85 @@
 </p:sld>
 </file>
 
+<file path=ppt/slides/slide17.xml><?xml version="1.0" encoding="utf-8"?>
+<p:sld xmlns:a="http://schemas.openxmlformats.org/drawingml/2006/main" xmlns:r="http://schemas.openxmlformats.org/officeDocument/2006/relationships" xmlns:p="http://schemas.openxmlformats.org/presentationml/2006/main">
+  <p:cSld>
+    <p:spTree>
+      <p:nvGrpSpPr>
+        <p:cNvPr id="1" name=""/>
+        <p:cNvGrpSpPr/>
+        <p:nvPr/>
+      </p:nvGrpSpPr>
+      <p:grpSpPr>
+        <a:xfrm>
+          <a:off x="0" y="0"/>
+          <a:ext cx="0" cy="0"/>
+          <a:chOff x="0" y="0"/>
+          <a:chExt cx="0" cy="0"/>
+        </a:xfrm>
+      </p:grpSpPr>
+      <p:sp>
+        <p:nvSpPr>
+          <p:cNvPr id="2" name="Title 1"/>
+          <p:cNvSpPr>
+            <a:spLocks noGrp="1"/>
+          </p:cNvSpPr>
+          <p:nvPr>
+            <p:ph type="title"/>
+          </p:nvPr>
+        </p:nvSpPr>
+        <p:spPr/>
+        <p:txBody>
+          <a:bodyPr>
+            <a:normAutofit fontScale="90000"/>
+          </a:bodyPr>
+          <a:lstStyle/>
+          <a:p>
+            <a:r>
+              <a:rPr lang="en-US" smtClean="0"/>
+              <a:t>Widget Model</a:t>
+            </a:r>
+            <a:endParaRPr lang="en-US"/>
+          </a:p>
+        </p:txBody>
+      </p:sp>
+      <p:sp>
+        <p:nvSpPr>
+          <p:cNvPr id="3" name="Slide Number Placeholder 2"/>
+          <p:cNvSpPr>
+            <a:spLocks noGrp="1"/>
+          </p:cNvSpPr>
+          <p:nvPr>
+            <p:ph type="sldNum" sz="quarter" idx="12"/>
+          </p:nvPr>
+        </p:nvSpPr>
+        <p:spPr/>
+        <p:txBody>
+          <a:bodyPr/>
+          <a:lstStyle/>
+          <a:p>
+            <a:fld id="{F1B1EB98-98E7-4A5A-BA8F-7513A9456E79}" type="slidenum">
+              <a:rPr lang="en-US" smtClean="0"/>
+              <a:pPr/>
+              <a:t>17</a:t>
+            </a:fld>
+            <a:endParaRPr lang="en-US" dirty="0"/>
+          </a:p>
+        </p:txBody>
+      </p:sp>
+    </p:spTree>
+    <p:extLst>
+      <p:ext uri="{BB962C8B-B14F-4D97-AF65-F5344CB8AC3E}">
+        <p14:creationId xmlns:p14="http://schemas.microsoft.com/office/powerpoint/2010/main" val="1863789199"/>
+      </p:ext>
+    </p:extLst>
+  </p:cSld>
+  <p:clrMapOvr>
+    <a:masterClrMapping/>
+  </p:clrMapOvr>
+</p:sld>
+</file>
+
 <file path=ppt/slides/slide2.xml><?xml version="1.0" encoding="utf-8"?>
 <p:sld xmlns:a="http://schemas.openxmlformats.org/drawingml/2006/main" xmlns:r="http://schemas.openxmlformats.org/officeDocument/2006/relationships" xmlns:p="http://schemas.openxmlformats.org/presentationml/2006/main">
   <p:cSld>
@@ -13700,9 +13780,37 @@
           </a:p>
         </p:txBody>
       </p:sp>
+      <p:sp>
+        <p:nvSpPr>
+          <p:cNvPr id="8" name="Slide Number Placeholder 7"/>
+          <p:cNvSpPr>
+            <a:spLocks noGrp="1"/>
+          </p:cNvSpPr>
+          <p:nvPr>
+            <p:ph type="sldNum" sz="quarter" idx="12"/>
+          </p:nvPr>
+        </p:nvSpPr>
+        <p:spPr/>
+        <p:txBody>
+          <a:bodyPr/>
+          <a:lstStyle/>
+          <a:p>
+            <a:r>
+              <a:rPr lang="en-US" smtClean="0"/>
+              <a:t>Page </a:t>
+            </a:r>
+            <a:fld id="{F1B1EB98-98E7-4A5A-BA8F-7513A9456E79}" type="slidenum">
+              <a:rPr lang="en-US" smtClean="0"/>
+              <a:pPr/>
+              <a:t>7</a:t>
+            </a:fld>
+            <a:endParaRPr lang="en-US" dirty="0"/>
+          </a:p>
+        </p:txBody>
+      </p:sp>
       <p:grpSp>
         <p:nvGrpSpPr>
-          <p:cNvPr id="6" name="Group 5"/>
+          <p:cNvPr id="19" name="Group 18"/>
           <p:cNvGrpSpPr/>
           <p:nvPr/>
         </p:nvGrpSpPr>
@@ -13710,7 +13818,7 @@
           <a:xfrm>
             <a:off x="2705101" y="1981200"/>
             <a:ext cx="3733800" cy="3352800"/>
-            <a:chOff x="2705101" y="2286000"/>
+            <a:chOff x="2705101" y="1981200"/>
             <a:chExt cx="3733800" cy="3352800"/>
           </a:xfrm>
         </p:grpSpPr>
@@ -13722,7 +13830,7 @@
           </p:nvSpPr>
           <p:spPr>
             <a:xfrm>
-              <a:off x="2705101" y="2286000"/>
+              <a:off x="2705101" y="1981200"/>
               <a:ext cx="3733800" cy="3352800"/>
             </a:xfrm>
             <a:prstGeom prst="rect">
@@ -13769,7 +13877,7 @@
           </p:nvSpPr>
           <p:spPr>
             <a:xfrm>
-              <a:off x="2808688" y="2390001"/>
+              <a:off x="2808688" y="2085201"/>
               <a:ext cx="658990" cy="276999"/>
             </a:xfrm>
             <a:prstGeom prst="rect">
@@ -13800,7 +13908,378 @@
           </p:nvSpPr>
           <p:spPr>
             <a:xfrm>
-              <a:off x="3467678" y="2379964"/>
+              <a:off x="3467678" y="2075164"/>
+              <a:ext cx="2856921" cy="287036"/>
+            </a:xfrm>
+            <a:prstGeom prst="roundRect">
+              <a:avLst/>
+            </a:prstGeom>
+            <a:noFill/>
+            <a:ln w="19050"/>
+          </p:spPr>
+          <p:style>
+            <a:lnRef idx="2">
+              <a:schemeClr val="accent1">
+                <a:shade val="50000"/>
+              </a:schemeClr>
+            </a:lnRef>
+            <a:fillRef idx="1">
+              <a:schemeClr val="accent1"/>
+            </a:fillRef>
+            <a:effectRef idx="0">
+              <a:schemeClr val="accent1"/>
+            </a:effectRef>
+            <a:fontRef idx="minor">
+              <a:schemeClr val="lt1"/>
+            </a:fontRef>
+          </p:style>
+          <p:txBody>
+            <a:bodyPr rtlCol="0" anchor="ctr"/>
+            <a:lstStyle/>
+            <a:p>
+              <a:pPr algn="ctr"/>
+              <a:endParaRPr lang="en-US"/>
+            </a:p>
+          </p:txBody>
+        </p:sp>
+        <p:sp>
+          <p:nvSpPr>
+            <p:cNvPr id="9" name="TextBox 8"/>
+            <p:cNvSpPr txBox="1"/>
+            <p:nvPr/>
+          </p:nvSpPr>
+          <p:spPr>
+            <a:xfrm>
+              <a:off x="2819400" y="2466201"/>
+              <a:ext cx="658990" cy="276999"/>
+            </a:xfrm>
+            <a:prstGeom prst="rect">
+              <a:avLst/>
+            </a:prstGeom>
+            <a:noFill/>
+          </p:spPr>
+          <p:txBody>
+            <a:bodyPr wrap="square" rtlCol="0">
+              <a:spAutoFit/>
+            </a:bodyPr>
+            <a:lstStyle/>
+            <a:p>
+              <a:pPr algn="r"/>
+              <a:r>
+                <a:rPr lang="en-US" sz="1200" dirty="0" smtClean="0"/>
+                <a:t>Min:</a:t>
+              </a:r>
+              <a:endParaRPr lang="en-US" sz="1200" dirty="0"/>
+            </a:p>
+          </p:txBody>
+        </p:sp>
+        <p:sp>
+          <p:nvSpPr>
+            <p:cNvPr id="10" name="Rounded Rectangle 9"/>
+            <p:cNvSpPr/>
+            <p:nvPr/>
+          </p:nvSpPr>
+          <p:spPr>
+            <a:xfrm>
+              <a:off x="3478390" y="2456164"/>
+              <a:ext cx="2856921" cy="287036"/>
+            </a:xfrm>
+            <a:prstGeom prst="roundRect">
+              <a:avLst/>
+            </a:prstGeom>
+            <a:noFill/>
+            <a:ln w="19050"/>
+          </p:spPr>
+          <p:style>
+            <a:lnRef idx="2">
+              <a:schemeClr val="accent1">
+                <a:shade val="50000"/>
+              </a:schemeClr>
+            </a:lnRef>
+            <a:fillRef idx="1">
+              <a:schemeClr val="accent1"/>
+            </a:fillRef>
+            <a:effectRef idx="0">
+              <a:schemeClr val="accent1"/>
+            </a:effectRef>
+            <a:fontRef idx="minor">
+              <a:schemeClr val="lt1"/>
+            </a:fontRef>
+          </p:style>
+          <p:txBody>
+            <a:bodyPr rtlCol="0" anchor="ctr"/>
+            <a:lstStyle/>
+            <a:p>
+              <a:pPr algn="ctr"/>
+              <a:endParaRPr lang="en-US"/>
+            </a:p>
+          </p:txBody>
+        </p:sp>
+        <p:sp>
+          <p:nvSpPr>
+            <p:cNvPr id="11" name="TextBox 10"/>
+            <p:cNvSpPr txBox="1"/>
+            <p:nvPr/>
+          </p:nvSpPr>
+          <p:spPr>
+            <a:xfrm>
+              <a:off x="2819400" y="2847201"/>
+              <a:ext cx="658990" cy="276999"/>
+            </a:xfrm>
+            <a:prstGeom prst="rect">
+              <a:avLst/>
+            </a:prstGeom>
+            <a:noFill/>
+          </p:spPr>
+          <p:txBody>
+            <a:bodyPr wrap="square" rtlCol="0">
+              <a:spAutoFit/>
+            </a:bodyPr>
+            <a:lstStyle/>
+            <a:p>
+              <a:pPr algn="r"/>
+              <a:r>
+                <a:rPr lang="en-US" sz="1200" dirty="0" smtClean="0"/>
+                <a:t>Max:</a:t>
+              </a:r>
+              <a:endParaRPr lang="en-US" sz="1200" dirty="0"/>
+            </a:p>
+          </p:txBody>
+        </p:sp>
+        <p:sp>
+          <p:nvSpPr>
+            <p:cNvPr id="12" name="Rounded Rectangle 11"/>
+            <p:cNvSpPr/>
+            <p:nvPr/>
+          </p:nvSpPr>
+          <p:spPr>
+            <a:xfrm>
+              <a:off x="3478390" y="2837164"/>
+              <a:ext cx="2856921" cy="287036"/>
+            </a:xfrm>
+            <a:prstGeom prst="roundRect">
+              <a:avLst/>
+            </a:prstGeom>
+            <a:noFill/>
+            <a:ln w="19050"/>
+          </p:spPr>
+          <p:style>
+            <a:lnRef idx="2">
+              <a:schemeClr val="accent1">
+                <a:shade val="50000"/>
+              </a:schemeClr>
+            </a:lnRef>
+            <a:fillRef idx="1">
+              <a:schemeClr val="accent1"/>
+            </a:fillRef>
+            <a:effectRef idx="0">
+              <a:schemeClr val="accent1"/>
+            </a:effectRef>
+            <a:fontRef idx="minor">
+              <a:schemeClr val="lt1"/>
+            </a:fontRef>
+          </p:style>
+          <p:txBody>
+            <a:bodyPr rtlCol="0" anchor="ctr"/>
+            <a:lstStyle/>
+            <a:p>
+              <a:pPr algn="ctr"/>
+              <a:endParaRPr lang="en-US"/>
+            </a:p>
+          </p:txBody>
+        </p:sp>
+        <p:sp>
+          <p:nvSpPr>
+            <p:cNvPr id="13" name="TextBox 12"/>
+            <p:cNvSpPr txBox="1"/>
+            <p:nvPr/>
+          </p:nvSpPr>
+          <p:spPr>
+            <a:xfrm>
+              <a:off x="2819400" y="3228201"/>
+              <a:ext cx="652272" cy="276999"/>
+            </a:xfrm>
+            <a:prstGeom prst="rect">
+              <a:avLst/>
+            </a:prstGeom>
+            <a:noFill/>
+          </p:spPr>
+          <p:txBody>
+            <a:bodyPr wrap="square" rtlCol="0">
+              <a:spAutoFit/>
+            </a:bodyPr>
+            <a:lstStyle/>
+            <a:p>
+              <a:pPr algn="r"/>
+              <a:r>
+                <a:rPr lang="en-US" sz="1200" dirty="0" smtClean="0"/>
+                <a:t>Visible:</a:t>
+              </a:r>
+              <a:endParaRPr lang="en-US" sz="1200" dirty="0"/>
+            </a:p>
+          </p:txBody>
+        </p:sp>
+        <p:sp>
+          <p:nvSpPr>
+            <p:cNvPr id="14" name="Rectangle 13"/>
+            <p:cNvSpPr/>
+            <p:nvPr/>
+          </p:nvSpPr>
+          <p:spPr>
+            <a:xfrm>
+              <a:off x="3471672" y="3311836"/>
+              <a:ext cx="109728" cy="109728"/>
+            </a:xfrm>
+            <a:prstGeom prst="rect">
+              <a:avLst/>
+            </a:prstGeom>
+            <a:solidFill>
+              <a:schemeClr val="bg1"/>
+            </a:solidFill>
+            <a:ln w="19050"/>
+          </p:spPr>
+          <p:style>
+            <a:lnRef idx="2">
+              <a:schemeClr val="accent1">
+                <a:shade val="50000"/>
+              </a:schemeClr>
+            </a:lnRef>
+            <a:fillRef idx="1">
+              <a:schemeClr val="accent1"/>
+            </a:fillRef>
+            <a:effectRef idx="0">
+              <a:schemeClr val="accent1"/>
+            </a:effectRef>
+            <a:fontRef idx="minor">
+              <a:schemeClr val="lt1"/>
+            </a:fontRef>
+          </p:style>
+          <p:txBody>
+            <a:bodyPr rtlCol="0" anchor="ctr"/>
+            <a:lstStyle/>
+            <a:p>
+              <a:pPr algn="ctr"/>
+              <a:endParaRPr lang="en-US"/>
+            </a:p>
+          </p:txBody>
+        </p:sp>
+        <p:sp>
+          <p:nvSpPr>
+            <p:cNvPr id="15" name="TextBox 14"/>
+            <p:cNvSpPr txBox="1"/>
+            <p:nvPr/>
+          </p:nvSpPr>
+          <p:spPr>
+            <a:xfrm>
+              <a:off x="2819400" y="3609201"/>
+              <a:ext cx="658990" cy="276999"/>
+            </a:xfrm>
+            <a:prstGeom prst="rect">
+              <a:avLst/>
+            </a:prstGeom>
+            <a:noFill/>
+          </p:spPr>
+          <p:txBody>
+            <a:bodyPr wrap="square" rtlCol="0">
+              <a:spAutoFit/>
+            </a:bodyPr>
+            <a:lstStyle/>
+            <a:p>
+              <a:pPr algn="r"/>
+              <a:r>
+                <a:rPr lang="en-US" sz="1200" dirty="0" smtClean="0"/>
+                <a:t>Mean:</a:t>
+              </a:r>
+              <a:endParaRPr lang="en-US" sz="1200" dirty="0"/>
+            </a:p>
+          </p:txBody>
+        </p:sp>
+        <p:sp>
+          <p:nvSpPr>
+            <p:cNvPr id="16" name="Rounded Rectangle 15"/>
+            <p:cNvSpPr/>
+            <p:nvPr/>
+          </p:nvSpPr>
+          <p:spPr>
+            <a:xfrm>
+              <a:off x="3478390" y="3599164"/>
+              <a:ext cx="2856921" cy="287036"/>
+            </a:xfrm>
+            <a:prstGeom prst="roundRect">
+              <a:avLst/>
+            </a:prstGeom>
+            <a:noFill/>
+            <a:ln w="19050"/>
+          </p:spPr>
+          <p:style>
+            <a:lnRef idx="2">
+              <a:schemeClr val="accent1">
+                <a:shade val="50000"/>
+              </a:schemeClr>
+            </a:lnRef>
+            <a:fillRef idx="1">
+              <a:schemeClr val="accent1"/>
+            </a:fillRef>
+            <a:effectRef idx="0">
+              <a:schemeClr val="accent1"/>
+            </a:effectRef>
+            <a:fontRef idx="minor">
+              <a:schemeClr val="lt1"/>
+            </a:fontRef>
+          </p:style>
+          <p:txBody>
+            <a:bodyPr rtlCol="0" anchor="ctr"/>
+            <a:lstStyle/>
+            <a:p>
+              <a:pPr algn="ctr"/>
+              <a:endParaRPr lang="en-US"/>
+            </a:p>
+          </p:txBody>
+        </p:sp>
+        <p:sp>
+          <p:nvSpPr>
+            <p:cNvPr id="17" name="TextBox 16"/>
+            <p:cNvSpPr txBox="1"/>
+            <p:nvPr/>
+          </p:nvSpPr>
+          <p:spPr>
+            <a:xfrm>
+              <a:off x="2819400" y="3990201"/>
+              <a:ext cx="658990" cy="276999"/>
+            </a:xfrm>
+            <a:prstGeom prst="rect">
+              <a:avLst/>
+            </a:prstGeom>
+            <a:noFill/>
+          </p:spPr>
+          <p:txBody>
+            <a:bodyPr wrap="square" rtlCol="0">
+              <a:spAutoFit/>
+            </a:bodyPr>
+            <a:lstStyle/>
+            <a:p>
+              <a:pPr algn="r"/>
+              <a:r>
+                <a:rPr lang="en-US" sz="1200" dirty="0" err="1" smtClean="0"/>
+                <a:t>Stddev</a:t>
+              </a:r>
+              <a:r>
+                <a:rPr lang="en-US" sz="1200" dirty="0" smtClean="0"/>
+                <a:t>:</a:t>
+              </a:r>
+              <a:endParaRPr lang="en-US" sz="1200" dirty="0"/>
+            </a:p>
+          </p:txBody>
+        </p:sp>
+        <p:sp>
+          <p:nvSpPr>
+            <p:cNvPr id="18" name="Rounded Rectangle 17"/>
+            <p:cNvSpPr/>
+            <p:nvPr/>
+          </p:nvSpPr>
+          <p:spPr>
+            <a:xfrm>
+              <a:off x="3478390" y="3980164"/>
               <a:ext cx="2856921" cy="287036"/>
             </a:xfrm>
             <a:prstGeom prst="roundRect">
@@ -13835,34 +14314,6 @@
           </p:txBody>
         </p:sp>
       </p:grpSp>
-      <p:sp>
-        <p:nvSpPr>
-          <p:cNvPr id="8" name="Slide Number Placeholder 7"/>
-          <p:cNvSpPr>
-            <a:spLocks noGrp="1"/>
-          </p:cNvSpPr>
-          <p:nvPr>
-            <p:ph type="sldNum" sz="quarter" idx="12"/>
-          </p:nvPr>
-        </p:nvSpPr>
-        <p:spPr/>
-        <p:txBody>
-          <a:bodyPr/>
-          <a:lstStyle/>
-          <a:p>
-            <a:r>
-              <a:rPr lang="en-US" smtClean="0"/>
-              <a:t>Page </a:t>
-            </a:r>
-            <a:fld id="{F1B1EB98-98E7-4A5A-BA8F-7513A9456E79}" type="slidenum">
-              <a:rPr lang="en-US" smtClean="0"/>
-              <a:pPr/>
-              <a:t>7</a:t>
-            </a:fld>
-            <a:endParaRPr lang="en-US" dirty="0"/>
-          </a:p>
-        </p:txBody>
-      </p:sp>
     </p:spTree>
     <p:extLst>
       <p:ext uri="{BB962C8B-B14F-4D97-AF65-F5344CB8AC3E}">

</xml_diff>

<commit_message>
Added SwingUtils.setFullScreen(). Fixed NPE in PlotContext. Fixed drawing issue in AxesWidget.
</commit_message>
<xml_diff>
--- a/java/JChartLib/docs/ui_framing.pptx
+++ b/java/JChartLib/docs/ui_framing.pptx
@@ -5,7 +5,7 @@
     <p:sldMasterId id="2147483660" r:id="rId1"/>
   </p:sldMasterIdLst>
   <p:notesMasterIdLst>
-    <p:notesMasterId r:id="rId19"/>
+    <p:notesMasterId r:id="rId29"/>
   </p:notesMasterIdLst>
   <p:sldIdLst>
     <p:sldId id="270" r:id="rId2"/>
@@ -25,6 +25,16 @@
     <p:sldId id="269" r:id="rId16"/>
     <p:sldId id="271" r:id="rId17"/>
     <p:sldId id="273" r:id="rId18"/>
+    <p:sldId id="275" r:id="rId19"/>
+    <p:sldId id="274" r:id="rId20"/>
+    <p:sldId id="276" r:id="rId21"/>
+    <p:sldId id="277" r:id="rId22"/>
+    <p:sldId id="278" r:id="rId23"/>
+    <p:sldId id="279" r:id="rId24"/>
+    <p:sldId id="280" r:id="rId25"/>
+    <p:sldId id="281" r:id="rId26"/>
+    <p:sldId id="282" r:id="rId27"/>
+    <p:sldId id="283" r:id="rId28"/>
   </p:sldIdLst>
   <p:sldSz cx="9144000" cy="6858000" type="screen4x3"/>
   <p:notesSz cx="7010400" cy="9296400"/>
@@ -208,7 +218,7 @@
           <a:p>
             <a:fld id="{451F6C7C-57B4-44C2-A879-518E542631BF}" type="datetimeFigureOut">
               <a:rPr lang="en-US" smtClean="0"/>
-              <a:t>4/27/2016</a:t>
+              <a:t>5/13/2016</a:t>
             </a:fld>
             <a:endParaRPr lang="en-US"/>
           </a:p>
@@ -741,7 +751,7 @@
           <a:p>
             <a:fld id="{7589139F-201B-47CA-A8A9-C8F47DFCF43B}" type="datetime1">
               <a:rPr lang="en-US" smtClean="0"/>
-              <a:t>4/27/2016</a:t>
+              <a:t>5/13/2016</a:t>
             </a:fld>
             <a:endParaRPr lang="en-US"/>
           </a:p>
@@ -921,7 +931,7 @@
           <a:p>
             <a:fld id="{39F8E332-08CA-426A-957F-5073818DEA06}" type="datetime1">
               <a:rPr lang="en-US" smtClean="0"/>
-              <a:t>4/27/2016</a:t>
+              <a:t>5/13/2016</a:t>
             </a:fld>
             <a:endParaRPr lang="en-US"/>
           </a:p>
@@ -1101,7 +1111,7 @@
           <a:p>
             <a:fld id="{1CCEE4AD-4EA4-4EE5-AB4F-5727B68DCDDB}" type="datetime1">
               <a:rPr lang="en-US" smtClean="0"/>
-              <a:t>4/27/2016</a:t>
+              <a:t>5/13/2016</a:t>
             </a:fld>
             <a:endParaRPr lang="en-US"/>
           </a:p>
@@ -1276,7 +1286,7 @@
           <a:p>
             <a:fld id="{74C45312-5D5A-413C-811E-51CC413D3FC7}" type="datetime1">
               <a:rPr lang="en-US" smtClean="0"/>
-              <a:t>4/27/2016</a:t>
+              <a:t>5/13/2016</a:t>
             </a:fld>
             <a:endParaRPr lang="en-US"/>
           </a:p>
@@ -1522,7 +1532,7 @@
           <a:p>
             <a:fld id="{443CEAA5-5CF4-4D08-9BB9-7D50715E21F2}" type="datetime1">
               <a:rPr lang="en-US" smtClean="0"/>
-              <a:t>4/27/2016</a:t>
+              <a:t>5/13/2016</a:t>
             </a:fld>
             <a:endParaRPr lang="en-US"/>
           </a:p>
@@ -1810,7 +1820,7 @@
           <a:p>
             <a:fld id="{B44EE941-BE00-4788-B7E8-C0AE4E10A9BF}" type="datetime1">
               <a:rPr lang="en-US" smtClean="0"/>
-              <a:t>4/27/2016</a:t>
+              <a:t>5/13/2016</a:t>
             </a:fld>
             <a:endParaRPr lang="en-US"/>
           </a:p>
@@ -2232,7 +2242,7 @@
           <a:p>
             <a:fld id="{CC540818-E0A3-45A0-B9E7-AB6964DB0AF7}" type="datetime1">
               <a:rPr lang="en-US" smtClean="0"/>
-              <a:t>4/27/2016</a:t>
+              <a:t>5/13/2016</a:t>
             </a:fld>
             <a:endParaRPr lang="en-US"/>
           </a:p>
@@ -2350,7 +2360,7 @@
         </p:nvSpPr>
         <p:spPr>
           <a:xfrm>
-            <a:off x="457200" y="6569075"/>
+            <a:off x="76200" y="6569075"/>
             <a:ext cx="2133600" cy="288925"/>
           </a:xfrm>
         </p:spPr>
@@ -2360,7 +2370,7 @@
           <a:p>
             <a:fld id="{107CA5CF-55FE-49DC-B3AC-623F4967B212}" type="datetime1">
               <a:rPr lang="en-US" smtClean="0"/>
-              <a:t>4/27/2016</a:t>
+              <a:t>5/13/2016</a:t>
             </a:fld>
             <a:endParaRPr lang="en-US"/>
           </a:p>
@@ -2402,7 +2412,7 @@
         </p:nvSpPr>
         <p:spPr>
           <a:xfrm>
-            <a:off x="6553200" y="6553200"/>
+            <a:off x="6934200" y="6553200"/>
             <a:ext cx="2133600" cy="228600"/>
           </a:xfrm>
         </p:spPr>
@@ -2470,7 +2480,7 @@
           <a:p>
             <a:fld id="{9C960BAF-EAC5-4B4A-B3FA-08DE80CD43DF}" type="datetime1">
               <a:rPr lang="en-US" smtClean="0"/>
-              <a:t>4/27/2016</a:t>
+              <a:t>5/13/2016</a:t>
             </a:fld>
             <a:endParaRPr lang="en-US"/>
           </a:p>
@@ -2752,7 +2762,7 @@
           <a:p>
             <a:fld id="{54F98608-D36E-481B-A2F2-5C486B7C18F6}" type="datetime1">
               <a:rPr lang="en-US" smtClean="0"/>
-              <a:t>4/27/2016</a:t>
+              <a:t>5/13/2016</a:t>
             </a:fld>
             <a:endParaRPr lang="en-US"/>
           </a:p>
@@ -3010,7 +3020,7 @@
           <a:p>
             <a:fld id="{726042FF-C265-4686-B492-9503F312B9F7}" type="datetime1">
               <a:rPr lang="en-US" smtClean="0"/>
-              <a:t>4/27/2016</a:t>
+              <a:t>5/13/2016</a:t>
             </a:fld>
             <a:endParaRPr lang="en-US"/>
           </a:p>
@@ -3200,7 +3210,7 @@
         </p:nvSpPr>
         <p:spPr>
           <a:xfrm>
-            <a:off x="457200" y="6553200"/>
+            <a:off x="76200" y="6553200"/>
             <a:ext cx="2133600" cy="244475"/>
           </a:xfrm>
           <a:prstGeom prst="rect">
@@ -3223,7 +3233,7 @@
           <a:p>
             <a:fld id="{CACDD5D5-767C-4EE7-8E36-1049EE603D55}" type="datetime1">
               <a:rPr lang="en-US" smtClean="0"/>
-              <a:t>4/27/2016</a:t>
+              <a:t>5/13/2016</a:t>
             </a:fld>
             <a:endParaRPr lang="en-US"/>
           </a:p>
@@ -3278,7 +3288,7 @@
         </p:nvSpPr>
         <p:spPr>
           <a:xfrm>
-            <a:off x="6553200" y="6553200"/>
+            <a:off x="6934200" y="6553200"/>
             <a:ext cx="2133600" cy="244475"/>
           </a:xfrm>
           <a:prstGeom prst="rect">
@@ -3748,10 +3758,6 @@
           <a:bodyPr/>
           <a:lstStyle/>
           <a:p>
-            <a:r>
-              <a:rPr lang="en-US" dirty="0" smtClean="0"/>
-              <a:t>Page </a:t>
-            </a:r>
             <a:fld id="{F1B1EB98-98E7-4A5A-BA8F-7513A9456E79}" type="slidenum">
               <a:rPr lang="en-US" smtClean="0"/>
               <a:pPr/>
@@ -4672,10 +4678,6 @@
           <a:bodyPr/>
           <a:lstStyle/>
           <a:p>
-            <a:r>
-              <a:rPr lang="en-US" smtClean="0"/>
-              <a:t>Page </a:t>
-            </a:r>
             <a:fld id="{F1B1EB98-98E7-4A5A-BA8F-7513A9456E79}" type="slidenum">
               <a:rPr lang="en-US" smtClean="0"/>
               <a:pPr/>
@@ -6054,10 +6056,6 @@
           <a:bodyPr/>
           <a:lstStyle/>
           <a:p>
-            <a:r>
-              <a:rPr lang="en-US" smtClean="0"/>
-              <a:t>Page </a:t>
-            </a:r>
             <a:fld id="{F1B1EB98-98E7-4A5A-BA8F-7513A9456E79}" type="slidenum">
               <a:rPr lang="en-US" smtClean="0"/>
               <a:pPr/>
@@ -6573,10 +6571,6 @@
           <a:bodyPr/>
           <a:lstStyle/>
           <a:p>
-            <a:r>
-              <a:rPr lang="en-US" smtClean="0"/>
-              <a:t>Page </a:t>
-            </a:r>
             <a:fld id="{F1B1EB98-98E7-4A5A-BA8F-7513A9456E79}" type="slidenum">
               <a:rPr lang="en-US" smtClean="0"/>
               <a:pPr/>
@@ -8829,10 +8823,6 @@
           <a:bodyPr/>
           <a:lstStyle/>
           <a:p>
-            <a:r>
-              <a:rPr lang="en-US" smtClean="0"/>
-              <a:t>Page </a:t>
-            </a:r>
             <a:fld id="{F1B1EB98-98E7-4A5A-BA8F-7513A9456E79}" type="slidenum">
               <a:rPr lang="en-US" smtClean="0"/>
               <a:pPr/>
@@ -9910,10 +9900,6 @@
           <a:bodyPr/>
           <a:lstStyle/>
           <a:p>
-            <a:r>
-              <a:rPr lang="en-US" smtClean="0"/>
-              <a:t>Page </a:t>
-            </a:r>
             <a:fld id="{F1B1EB98-98E7-4A5A-BA8F-7513A9456E79}" type="slidenum">
               <a:rPr lang="en-US" smtClean="0"/>
               <a:pPr/>
@@ -10091,10 +10077,86 @@
           <a:lstStyle/>
           <a:p>
             <a:r>
-              <a:rPr lang="en-US" smtClean="0"/>
-              <a:t>Widget Model</a:t>
+              <a:rPr lang="en-US" dirty="0" smtClean="0"/>
+              <a:t>Lines and Backgrounds</a:t>
             </a:r>
-            <a:endParaRPr lang="en-US"/>
+            <a:endParaRPr lang="en-US" dirty="0"/>
+          </a:p>
+        </p:txBody>
+      </p:sp>
+      <p:sp>
+        <p:nvSpPr>
+          <p:cNvPr id="4" name="Content Placeholder 3"/>
+          <p:cNvSpPr>
+            <a:spLocks noGrp="1"/>
+          </p:cNvSpPr>
+          <p:nvPr>
+            <p:ph idx="1"/>
+          </p:nvPr>
+        </p:nvSpPr>
+        <p:spPr/>
+        <p:txBody>
+          <a:bodyPr>
+            <a:normAutofit lnSpcReduction="10000"/>
+          </a:bodyPr>
+          <a:lstStyle/>
+          <a:p>
+            <a:r>
+              <a:rPr lang="en-US" dirty="0" err="1" smtClean="0"/>
+              <a:t>LineStyle</a:t>
+            </a:r>
+            <a:endParaRPr lang="en-US" dirty="0" smtClean="0"/>
+          </a:p>
+          <a:p>
+            <a:pPr lvl="1"/>
+            <a:r>
+              <a:rPr lang="en-US" dirty="0" err="1" smtClean="0"/>
+              <a:t>type:LineType</a:t>
+            </a:r>
+            <a:r>
+              <a:rPr lang="en-US" dirty="0" smtClean="0"/>
+              <a:t> - A line can be solid, dots, or dashes.</a:t>
+            </a:r>
+          </a:p>
+          <a:p>
+            <a:pPr lvl="1"/>
+            <a:r>
+              <a:rPr lang="en-US" dirty="0" err="1" smtClean="0"/>
+              <a:t>weight:int</a:t>
+            </a:r>
+            <a:r>
+              <a:rPr lang="en-US" dirty="0" smtClean="0"/>
+              <a:t> – the weight of the line in pixels.</a:t>
+            </a:r>
+          </a:p>
+          <a:p>
+            <a:pPr lvl="1"/>
+            <a:r>
+              <a:rPr lang="en-US" dirty="0" err="1" smtClean="0"/>
+              <a:t>color:Color</a:t>
+            </a:r>
+            <a:r>
+              <a:rPr lang="en-US" dirty="0" smtClean="0"/>
+              <a:t>.</a:t>
+            </a:r>
+          </a:p>
+          <a:p>
+            <a:pPr lvl="1"/>
+            <a:r>
+              <a:rPr lang="en-US" dirty="0" err="1" smtClean="0"/>
+              <a:t>end:Consider</a:t>
+            </a:r>
+            <a:r>
+              <a:rPr lang="en-US" dirty="0" smtClean="0"/>
+              <a:t> adding a line connection method.</a:t>
+            </a:r>
+          </a:p>
+          <a:p>
+            <a:r>
+              <a:rPr lang="en-US" dirty="0" smtClean="0"/>
+              <a:t>Background – A background can be either transparent, a solid color, a pattern, an image, or a color gradient. A background can be applied to both the chart and the plot area. The background for the plot area will always be drawn on top of the chart background.</a:t>
+            </a:r>
+            <a:endParaRPr lang="en-US" dirty="0"/>
           </a:p>
         </p:txBody>
       </p:sp>
@@ -10126,6 +10188,385 @@
     <p:extLst>
       <p:ext uri="{BB962C8B-B14F-4D97-AF65-F5344CB8AC3E}">
         <p14:creationId xmlns:p14="http://schemas.microsoft.com/office/powerpoint/2010/main" val="1863789199"/>
+      </p:ext>
+    </p:extLst>
+  </p:cSld>
+  <p:clrMapOvr>
+    <a:masterClrMapping/>
+  </p:clrMapOvr>
+</p:sld>
+</file>
+
+<file path=ppt/slides/slide18.xml><?xml version="1.0" encoding="utf-8"?>
+<p:sld xmlns:a="http://schemas.openxmlformats.org/drawingml/2006/main" xmlns:r="http://schemas.openxmlformats.org/officeDocument/2006/relationships" xmlns:p="http://schemas.openxmlformats.org/presentationml/2006/main">
+  <p:cSld>
+    <p:spTree>
+      <p:nvGrpSpPr>
+        <p:cNvPr id="1" name=""/>
+        <p:cNvGrpSpPr/>
+        <p:nvPr/>
+      </p:nvGrpSpPr>
+      <p:grpSpPr>
+        <a:xfrm>
+          <a:off x="0" y="0"/>
+          <a:ext cx="0" cy="0"/>
+          <a:chOff x="0" y="0"/>
+          <a:chExt cx="0" cy="0"/>
+        </a:xfrm>
+      </p:grpSpPr>
+      <p:sp>
+        <p:nvSpPr>
+          <p:cNvPr id="2" name="Title 1"/>
+          <p:cNvSpPr>
+            <a:spLocks noGrp="1"/>
+          </p:cNvSpPr>
+          <p:nvPr>
+            <p:ph type="title"/>
+          </p:nvPr>
+        </p:nvSpPr>
+        <p:spPr/>
+        <p:txBody>
+          <a:bodyPr>
+            <a:normAutofit fontScale="90000"/>
+          </a:bodyPr>
+          <a:lstStyle/>
+          <a:p>
+            <a:endParaRPr lang="en-US"/>
+          </a:p>
+        </p:txBody>
+      </p:sp>
+      <p:sp>
+        <p:nvSpPr>
+          <p:cNvPr id="3" name="Content Placeholder 2"/>
+          <p:cNvSpPr>
+            <a:spLocks noGrp="1"/>
+          </p:cNvSpPr>
+          <p:nvPr>
+            <p:ph idx="1"/>
+          </p:nvPr>
+        </p:nvSpPr>
+        <p:spPr/>
+        <p:txBody>
+          <a:bodyPr/>
+          <a:lstStyle/>
+          <a:p>
+            <a:r>
+              <a:rPr lang="en-US" dirty="0" err="1" smtClean="0"/>
+              <a:t>TextLabel</a:t>
+            </a:r>
+            <a:endParaRPr lang="en-US" dirty="0" smtClean="0"/>
+          </a:p>
+          <a:p>
+            <a:pPr lvl="1"/>
+            <a:r>
+              <a:rPr lang="en-US" dirty="0" err="1" smtClean="0"/>
+              <a:t>visible:boolean</a:t>
+            </a:r>
+            <a:endParaRPr lang="en-US" dirty="0" smtClean="0"/>
+          </a:p>
+          <a:p>
+            <a:pPr lvl="1"/>
+            <a:r>
+              <a:rPr lang="en-US" dirty="0" err="1" smtClean="0"/>
+              <a:t>text:String</a:t>
+            </a:r>
+            <a:endParaRPr lang="en-US" dirty="0" smtClean="0"/>
+          </a:p>
+          <a:p>
+            <a:pPr lvl="1"/>
+            <a:r>
+              <a:rPr lang="en-US" dirty="0" err="1" smtClean="0"/>
+              <a:t>style:TextStyle</a:t>
+            </a:r>
+            <a:endParaRPr lang="en-US" dirty="0" smtClean="0"/>
+          </a:p>
+          <a:p>
+            <a:r>
+              <a:rPr lang="en-US" dirty="0" err="1" smtClean="0"/>
+              <a:t>TextStyle</a:t>
+            </a:r>
+            <a:endParaRPr lang="en-US" dirty="0" smtClean="0"/>
+          </a:p>
+          <a:p>
+            <a:pPr lvl="1"/>
+            <a:r>
+              <a:rPr lang="en-US" dirty="0" err="1" smtClean="0"/>
+              <a:t>font:Font</a:t>
+            </a:r>
+            <a:endParaRPr lang="en-US" dirty="0" smtClean="0"/>
+          </a:p>
+          <a:p>
+            <a:pPr lvl="1"/>
+            <a:r>
+              <a:rPr lang="en-US" dirty="0" err="1" smtClean="0"/>
+              <a:t>color:Color</a:t>
+            </a:r>
+            <a:endParaRPr lang="en-US" dirty="0" smtClean="0"/>
+          </a:p>
+          <a:p>
+            <a:pPr lvl="1"/>
+            <a:r>
+              <a:rPr lang="en-US" dirty="0" err="1" smtClean="0"/>
+              <a:t>halign:HorizAlignment</a:t>
+            </a:r>
+            <a:r>
+              <a:rPr lang="en-US" dirty="0" smtClean="0"/>
+              <a:t> – Left, Right, Center</a:t>
+            </a:r>
+          </a:p>
+          <a:p>
+            <a:pPr lvl="1"/>
+            <a:r>
+              <a:rPr lang="en-US" dirty="0" err="1" smtClean="0"/>
+              <a:t>valign:VertAlignment</a:t>
+            </a:r>
+            <a:r>
+              <a:rPr lang="en-US" dirty="0" smtClean="0"/>
+              <a:t> – Top, Middle, Bottom</a:t>
+            </a:r>
+          </a:p>
+          <a:p>
+            <a:pPr lvl="1"/>
+            <a:endParaRPr lang="en-US" dirty="0"/>
+          </a:p>
+        </p:txBody>
+      </p:sp>
+      <p:sp>
+        <p:nvSpPr>
+          <p:cNvPr id="4" name="Slide Number Placeholder 3"/>
+          <p:cNvSpPr>
+            <a:spLocks noGrp="1"/>
+          </p:cNvSpPr>
+          <p:nvPr>
+            <p:ph type="sldNum" sz="quarter" idx="12"/>
+          </p:nvPr>
+        </p:nvSpPr>
+        <p:spPr/>
+        <p:txBody>
+          <a:bodyPr/>
+          <a:lstStyle/>
+          <a:p>
+            <a:fld id="{F1B1EB98-98E7-4A5A-BA8F-7513A9456E79}" type="slidenum">
+              <a:rPr lang="en-US" smtClean="0"/>
+              <a:t>18</a:t>
+            </a:fld>
+            <a:endParaRPr lang="en-US"/>
+          </a:p>
+        </p:txBody>
+      </p:sp>
+    </p:spTree>
+    <p:extLst>
+      <p:ext uri="{BB962C8B-B14F-4D97-AF65-F5344CB8AC3E}">
+        <p14:creationId xmlns:p14="http://schemas.microsoft.com/office/powerpoint/2010/main" val="3846208342"/>
+      </p:ext>
+    </p:extLst>
+  </p:cSld>
+  <p:clrMapOvr>
+    <a:masterClrMapping/>
+  </p:clrMapOvr>
+</p:sld>
+</file>
+
+<file path=ppt/slides/slide19.xml><?xml version="1.0" encoding="utf-8"?>
+<p:sld xmlns:a="http://schemas.openxmlformats.org/drawingml/2006/main" xmlns:r="http://schemas.openxmlformats.org/officeDocument/2006/relationships" xmlns:p="http://schemas.openxmlformats.org/presentationml/2006/main">
+  <p:cSld>
+    <p:spTree>
+      <p:nvGrpSpPr>
+        <p:cNvPr id="1" name=""/>
+        <p:cNvGrpSpPr/>
+        <p:nvPr/>
+      </p:nvGrpSpPr>
+      <p:grpSpPr>
+        <a:xfrm>
+          <a:off x="0" y="0"/>
+          <a:ext cx="0" cy="0"/>
+          <a:chOff x="0" y="0"/>
+          <a:chExt cx="0" cy="0"/>
+        </a:xfrm>
+      </p:grpSpPr>
+      <p:sp>
+        <p:nvSpPr>
+          <p:cNvPr id="2" name="Title 1"/>
+          <p:cNvSpPr>
+            <a:spLocks noGrp="1"/>
+          </p:cNvSpPr>
+          <p:nvPr>
+            <p:ph type="title"/>
+          </p:nvPr>
+        </p:nvSpPr>
+        <p:spPr/>
+        <p:txBody>
+          <a:bodyPr>
+            <a:normAutofit fontScale="90000"/>
+          </a:bodyPr>
+          <a:lstStyle/>
+          <a:p>
+            <a:r>
+              <a:rPr lang="en-US" dirty="0" smtClean="0"/>
+              <a:t>Axes Definition</a:t>
+            </a:r>
+            <a:endParaRPr lang="en-US" dirty="0"/>
+          </a:p>
+        </p:txBody>
+      </p:sp>
+      <p:sp>
+        <p:nvSpPr>
+          <p:cNvPr id="3" name="Content Placeholder 2"/>
+          <p:cNvSpPr>
+            <a:spLocks noGrp="1"/>
+          </p:cNvSpPr>
+          <p:nvPr>
+            <p:ph idx="1"/>
+          </p:nvPr>
+        </p:nvSpPr>
+        <p:spPr/>
+        <p:txBody>
+          <a:bodyPr>
+            <a:normAutofit fontScale="70000" lnSpcReduction="20000"/>
+          </a:bodyPr>
+          <a:lstStyle/>
+          <a:p>
+            <a:pPr marL="0" indent="0">
+              <a:buNone/>
+            </a:pPr>
+            <a:r>
+              <a:rPr lang="en-US" dirty="0" smtClean="0"/>
+              <a:t>There are primary (left vs bottom), secondary (right vs. top), off-area axes (those that sit to the top, left, bottom, or right of the plot area but do not touch it).</a:t>
+            </a:r>
+          </a:p>
+          <a:p>
+            <a:r>
+              <a:rPr lang="en-US" dirty="0" smtClean="0"/>
+              <a:t>Axis – each axis has the following properties:</a:t>
+            </a:r>
+          </a:p>
+          <a:p>
+            <a:pPr lvl="1"/>
+            <a:r>
+              <a:rPr lang="en-US" dirty="0" smtClean="0"/>
+              <a:t>bounds (min/max)</a:t>
+            </a:r>
+          </a:p>
+          <a:p>
+            <a:pPr lvl="1"/>
+            <a:r>
+              <a:rPr lang="en-US" smtClean="0"/>
+              <a:t>drawBaseLine:boolean</a:t>
+            </a:r>
+            <a:endParaRPr lang="en-US" dirty="0" smtClean="0"/>
+          </a:p>
+          <a:p>
+            <a:pPr lvl="1"/>
+            <a:r>
+              <a:rPr lang="en-US" dirty="0" err="1" smtClean="0"/>
+              <a:t>drawTickLine:boolean</a:t>
+            </a:r>
+            <a:endParaRPr lang="en-US" dirty="0" smtClean="0"/>
+          </a:p>
+          <a:p>
+            <a:pPr lvl="1"/>
+            <a:r>
+              <a:rPr lang="en-US" dirty="0" err="1" smtClean="0"/>
+              <a:t>ticks:List</a:t>
+            </a:r>
+            <a:r>
+              <a:rPr lang="en-US" dirty="0" smtClean="0"/>
+              <a:t>&lt;Tick&gt;</a:t>
+            </a:r>
+          </a:p>
+          <a:p>
+            <a:pPr lvl="2"/>
+            <a:r>
+              <a:rPr lang="en-US" dirty="0" err="1" smtClean="0"/>
+              <a:t>value:double</a:t>
+            </a:r>
+            <a:r>
+              <a:rPr lang="en-US" dirty="0" smtClean="0"/>
+              <a:t> – the value must be between min and max and defines where the tick is drawn.</a:t>
+            </a:r>
+          </a:p>
+          <a:p>
+            <a:pPr lvl="2"/>
+            <a:r>
+              <a:rPr lang="en-US" dirty="0" err="1" smtClean="0"/>
+              <a:t>text:String</a:t>
+            </a:r>
+            <a:r>
+              <a:rPr lang="en-US" dirty="0" smtClean="0"/>
+              <a:t> – defines the text to be drawn at that tick.</a:t>
+            </a:r>
+          </a:p>
+          <a:p>
+            <a:pPr lvl="1"/>
+            <a:r>
+              <a:rPr lang="en-US" dirty="0" err="1" smtClean="0"/>
+              <a:t>minorTickCount:int</a:t>
+            </a:r>
+            <a:r>
+              <a:rPr lang="en-US" dirty="0" smtClean="0"/>
+              <a:t> – the number of minor ticks (not tick sections) between major ticks (e.g. a minor tick at each number with major ticks at 0 and 10 would result in 9 ticks and 10 tick sections).</a:t>
+            </a:r>
+          </a:p>
+          <a:p>
+            <a:pPr lvl="1"/>
+            <a:r>
+              <a:rPr lang="en-US" dirty="0" smtClean="0"/>
+              <a:t>Direction (inner/outer) – defines the direction that the tick points from the axis line. The tick text is always placed outside the axis line.</a:t>
+            </a:r>
+          </a:p>
+          <a:p>
+            <a:pPr lvl="1"/>
+            <a:r>
+              <a:rPr lang="en-US" dirty="0" err="1" smtClean="0"/>
+              <a:t>line:LineStyle</a:t>
+            </a:r>
+            <a:endParaRPr lang="en-US" dirty="0" smtClean="0"/>
+          </a:p>
+          <a:p>
+            <a:pPr lvl="1"/>
+            <a:r>
+              <a:rPr lang="en-US" dirty="0" err="1" smtClean="0"/>
+              <a:t>title:TextLabel</a:t>
+            </a:r>
+            <a:endParaRPr lang="en-US" dirty="0" smtClean="0"/>
+          </a:p>
+          <a:p>
+            <a:pPr lvl="1"/>
+            <a:r>
+              <a:rPr lang="en-US" dirty="0" err="1" smtClean="0"/>
+              <a:t>tickTextStyle:TextStyle</a:t>
+            </a:r>
+            <a:endParaRPr lang="en-US" dirty="0"/>
+          </a:p>
+        </p:txBody>
+      </p:sp>
+      <p:sp>
+        <p:nvSpPr>
+          <p:cNvPr id="4" name="Slide Number Placeholder 3"/>
+          <p:cNvSpPr>
+            <a:spLocks noGrp="1"/>
+          </p:cNvSpPr>
+          <p:nvPr>
+            <p:ph type="sldNum" sz="quarter" idx="12"/>
+          </p:nvPr>
+        </p:nvSpPr>
+        <p:spPr/>
+        <p:txBody>
+          <a:bodyPr/>
+          <a:lstStyle/>
+          <a:p>
+            <a:fld id="{F1B1EB98-98E7-4A5A-BA8F-7513A9456E79}" type="slidenum">
+              <a:rPr lang="en-US" smtClean="0"/>
+              <a:t>19</a:t>
+            </a:fld>
+            <a:endParaRPr lang="en-US"/>
+          </a:p>
+        </p:txBody>
+      </p:sp>
+    </p:spTree>
+    <p:extLst>
+      <p:ext uri="{BB962C8B-B14F-4D97-AF65-F5344CB8AC3E}">
+        <p14:creationId xmlns:p14="http://schemas.microsoft.com/office/powerpoint/2010/main" val="2787888141"/>
       </p:ext>
     </p:extLst>
   </p:cSld>
@@ -11115,10 +11556,6 @@
           <a:bodyPr/>
           <a:lstStyle/>
           <a:p>
-            <a:r>
-              <a:rPr lang="en-US" smtClean="0"/>
-              <a:t>Page </a:t>
-            </a:r>
             <a:fld id="{F1B1EB98-98E7-4A5A-BA8F-7513A9456E79}" type="slidenum">
               <a:rPr lang="en-US" smtClean="0"/>
               <a:pPr/>
@@ -11132,6 +11569,1204 @@
     <p:extLst>
       <p:ext uri="{BB962C8B-B14F-4D97-AF65-F5344CB8AC3E}">
         <p14:creationId xmlns:p14="http://schemas.microsoft.com/office/powerpoint/2010/main" val="4154363597"/>
+      </p:ext>
+    </p:extLst>
+  </p:cSld>
+  <p:clrMapOvr>
+    <a:masterClrMapping/>
+  </p:clrMapOvr>
+</p:sld>
+</file>
+
+<file path=ppt/slides/slide20.xml><?xml version="1.0" encoding="utf-8"?>
+<p:sld xmlns:a="http://schemas.openxmlformats.org/drawingml/2006/main" xmlns:r="http://schemas.openxmlformats.org/officeDocument/2006/relationships" xmlns:p="http://schemas.openxmlformats.org/presentationml/2006/main">
+  <p:cSld>
+    <p:spTree>
+      <p:nvGrpSpPr>
+        <p:cNvPr id="1" name=""/>
+        <p:cNvGrpSpPr/>
+        <p:nvPr/>
+      </p:nvGrpSpPr>
+      <p:grpSpPr>
+        <a:xfrm>
+          <a:off x="0" y="0"/>
+          <a:ext cx="0" cy="0"/>
+          <a:chOff x="0" y="0"/>
+          <a:chExt cx="0" cy="0"/>
+        </a:xfrm>
+      </p:grpSpPr>
+      <p:sp>
+        <p:nvSpPr>
+          <p:cNvPr id="2" name="Title 1"/>
+          <p:cNvSpPr>
+            <a:spLocks noGrp="1"/>
+          </p:cNvSpPr>
+          <p:nvPr>
+            <p:ph type="title"/>
+          </p:nvPr>
+        </p:nvSpPr>
+        <p:spPr/>
+        <p:txBody>
+          <a:bodyPr>
+            <a:normAutofit fontScale="90000"/>
+          </a:bodyPr>
+          <a:lstStyle/>
+          <a:p>
+            <a:r>
+              <a:rPr lang="en-US" dirty="0" err="1" smtClean="0"/>
+              <a:t>PlotArea</a:t>
+            </a:r>
+            <a:endParaRPr lang="en-US" dirty="0"/>
+          </a:p>
+        </p:txBody>
+      </p:sp>
+      <p:sp>
+        <p:nvSpPr>
+          <p:cNvPr id="3" name="Content Placeholder 2"/>
+          <p:cNvSpPr>
+            <a:spLocks noGrp="1"/>
+          </p:cNvSpPr>
+          <p:nvPr>
+            <p:ph idx="1"/>
+          </p:nvPr>
+        </p:nvSpPr>
+        <p:spPr/>
+        <p:txBody>
+          <a:bodyPr>
+            <a:normAutofit fontScale="85000" lnSpcReduction="20000"/>
+          </a:bodyPr>
+          <a:lstStyle/>
+          <a:p>
+            <a:r>
+              <a:rPr lang="en-US" dirty="0" err="1" smtClean="0"/>
+              <a:t>gridlines:boolean</a:t>
+            </a:r>
+            <a:endParaRPr lang="en-US" dirty="0" smtClean="0"/>
+          </a:p>
+          <a:p>
+            <a:r>
+              <a:rPr lang="en-US" dirty="0" err="1" smtClean="0"/>
+              <a:t>gridStyle:LineStyle</a:t>
+            </a:r>
+            <a:endParaRPr lang="en-US" dirty="0" smtClean="0"/>
+          </a:p>
+          <a:p>
+            <a:r>
+              <a:rPr lang="en-US" dirty="0" err="1" smtClean="0"/>
+              <a:t>frameAxes:boolean</a:t>
+            </a:r>
+            <a:r>
+              <a:rPr lang="en-US" dirty="0" smtClean="0"/>
+              <a:t> – draws axes as a square frame regardless of the presence of secondary series.</a:t>
+            </a:r>
+          </a:p>
+          <a:p>
+            <a:r>
+              <a:rPr lang="en-US" dirty="0" err="1" smtClean="0"/>
+              <a:t>domain:Axis</a:t>
+            </a:r>
+            <a:endParaRPr lang="en-US" dirty="0" smtClean="0"/>
+          </a:p>
+          <a:p>
+            <a:r>
+              <a:rPr lang="en-US" dirty="0" err="1" smtClean="0"/>
+              <a:t>range:Axis</a:t>
+            </a:r>
+            <a:endParaRPr lang="en-US" dirty="0" smtClean="0"/>
+          </a:p>
+          <a:p>
+            <a:r>
+              <a:rPr lang="en-US" dirty="0" err="1" smtClean="0"/>
+              <a:t>secDomain:Axis</a:t>
+            </a:r>
+            <a:endParaRPr lang="en-US" dirty="0" smtClean="0"/>
+          </a:p>
+          <a:p>
+            <a:r>
+              <a:rPr lang="en-US" dirty="0" err="1" smtClean="0"/>
+              <a:t>secRange:Axis</a:t>
+            </a:r>
+            <a:endParaRPr lang="en-US" dirty="0" smtClean="0"/>
+          </a:p>
+          <a:p>
+            <a:r>
+              <a:rPr lang="en-US" dirty="0" err="1" smtClean="0"/>
+              <a:t>topAxes:List</a:t>
+            </a:r>
+            <a:r>
+              <a:rPr lang="en-US" dirty="0" smtClean="0"/>
+              <a:t>&lt;Axis&gt;</a:t>
+            </a:r>
+          </a:p>
+          <a:p>
+            <a:r>
+              <a:rPr lang="en-US" dirty="0" err="1" smtClean="0"/>
+              <a:t>leftAxes:List</a:t>
+            </a:r>
+            <a:r>
+              <a:rPr lang="en-US" dirty="0" smtClean="0"/>
+              <a:t>&lt;Axis&gt;</a:t>
+            </a:r>
+          </a:p>
+          <a:p>
+            <a:r>
+              <a:rPr lang="en-US" dirty="0" err="1" smtClean="0"/>
+              <a:t>bottomAxes:List</a:t>
+            </a:r>
+            <a:r>
+              <a:rPr lang="en-US" dirty="0" smtClean="0"/>
+              <a:t>&lt;Axis&gt;</a:t>
+            </a:r>
+          </a:p>
+          <a:p>
+            <a:r>
+              <a:rPr lang="en-US" dirty="0" err="1" smtClean="0"/>
+              <a:t>rightAxes:List</a:t>
+            </a:r>
+            <a:r>
+              <a:rPr lang="en-US" dirty="0" smtClean="0"/>
+              <a:t>&lt;Axis&gt;</a:t>
+            </a:r>
+          </a:p>
+          <a:p>
+            <a:r>
+              <a:rPr lang="en-US" dirty="0" err="1" smtClean="0"/>
+              <a:t>background:Background</a:t>
+            </a:r>
+            <a:endParaRPr lang="en-US" dirty="0"/>
+          </a:p>
+        </p:txBody>
+      </p:sp>
+      <p:sp>
+        <p:nvSpPr>
+          <p:cNvPr id="4" name="Slide Number Placeholder 3"/>
+          <p:cNvSpPr>
+            <a:spLocks noGrp="1"/>
+          </p:cNvSpPr>
+          <p:nvPr>
+            <p:ph type="sldNum" sz="quarter" idx="12"/>
+          </p:nvPr>
+        </p:nvSpPr>
+        <p:spPr/>
+        <p:txBody>
+          <a:bodyPr/>
+          <a:lstStyle/>
+          <a:p>
+            <a:fld id="{F1B1EB98-98E7-4A5A-BA8F-7513A9456E79}" type="slidenum">
+              <a:rPr lang="en-US" smtClean="0"/>
+              <a:t>20</a:t>
+            </a:fld>
+            <a:endParaRPr lang="en-US"/>
+          </a:p>
+        </p:txBody>
+      </p:sp>
+    </p:spTree>
+    <p:extLst>
+      <p:ext uri="{BB962C8B-B14F-4D97-AF65-F5344CB8AC3E}">
+        <p14:creationId xmlns:p14="http://schemas.microsoft.com/office/powerpoint/2010/main" val="2537969424"/>
+      </p:ext>
+    </p:extLst>
+  </p:cSld>
+  <p:clrMapOvr>
+    <a:masterClrMapping/>
+  </p:clrMapOvr>
+</p:sld>
+</file>
+
+<file path=ppt/slides/slide21.xml><?xml version="1.0" encoding="utf-8"?>
+<p:sld xmlns:a="http://schemas.openxmlformats.org/drawingml/2006/main" xmlns:r="http://schemas.openxmlformats.org/officeDocument/2006/relationships" xmlns:p="http://schemas.openxmlformats.org/presentationml/2006/main">
+  <p:cSld>
+    <p:spTree>
+      <p:nvGrpSpPr>
+        <p:cNvPr id="1" name=""/>
+        <p:cNvGrpSpPr/>
+        <p:nvPr/>
+      </p:nvGrpSpPr>
+      <p:grpSpPr>
+        <a:xfrm>
+          <a:off x="0" y="0"/>
+          <a:ext cx="0" cy="0"/>
+          <a:chOff x="0" y="0"/>
+          <a:chExt cx="0" cy="0"/>
+        </a:xfrm>
+      </p:grpSpPr>
+      <p:sp>
+        <p:nvSpPr>
+          <p:cNvPr id="2" name="Title 1"/>
+          <p:cNvSpPr>
+            <a:spLocks noGrp="1"/>
+          </p:cNvSpPr>
+          <p:nvPr>
+            <p:ph type="title"/>
+          </p:nvPr>
+        </p:nvSpPr>
+        <p:spPr/>
+        <p:txBody>
+          <a:bodyPr>
+            <a:normAutofit fontScale="90000"/>
+          </a:bodyPr>
+          <a:lstStyle/>
+          <a:p>
+            <a:r>
+              <a:rPr lang="en-US" dirty="0" smtClean="0"/>
+              <a:t>Control Room (The Martian)</a:t>
+            </a:r>
+            <a:endParaRPr lang="en-US" dirty="0"/>
+          </a:p>
+        </p:txBody>
+      </p:sp>
+      <p:sp>
+        <p:nvSpPr>
+          <p:cNvPr id="3" name="Slide Number Placeholder 2"/>
+          <p:cNvSpPr>
+            <a:spLocks noGrp="1"/>
+          </p:cNvSpPr>
+          <p:nvPr>
+            <p:ph type="sldNum" sz="quarter" idx="12"/>
+          </p:nvPr>
+        </p:nvSpPr>
+        <p:spPr/>
+        <p:txBody>
+          <a:bodyPr/>
+          <a:lstStyle/>
+          <a:p>
+            <a:fld id="{F1B1EB98-98E7-4A5A-BA8F-7513A9456E79}" type="slidenum">
+              <a:rPr lang="en-US" smtClean="0"/>
+              <a:pPr/>
+              <a:t>21</a:t>
+            </a:fld>
+            <a:endParaRPr lang="en-US" dirty="0"/>
+          </a:p>
+        </p:txBody>
+      </p:sp>
+      <p:pic>
+        <p:nvPicPr>
+          <p:cNvPr id="1026" name="Picture 2" descr="http://cdn.collider.com/wp-content/uploads/2015/06/the-martian-movie-image-control-room.jpg"/>
+          <p:cNvPicPr>
+            <a:picLocks noChangeAspect="1" noChangeArrowheads="1"/>
+          </p:cNvPicPr>
+          <p:nvPr/>
+        </p:nvPicPr>
+        <p:blipFill>
+          <a:blip r:embed="rId2" cstate="print">
+            <a:extLst>
+              <a:ext uri="{28A0092B-C50C-407E-A947-70E740481C1C}">
+                <a14:useLocalDpi xmlns:a14="http://schemas.microsoft.com/office/drawing/2010/main" val="0"/>
+              </a:ext>
+            </a:extLst>
+          </a:blip>
+          <a:srcRect/>
+          <a:stretch>
+            <a:fillRect/>
+          </a:stretch>
+        </p:blipFill>
+        <p:spPr bwMode="auto">
+          <a:xfrm>
+            <a:off x="228601" y="914400"/>
+            <a:ext cx="8676780" cy="4576176"/>
+          </a:xfrm>
+          <a:prstGeom prst="rect">
+            <a:avLst/>
+          </a:prstGeom>
+          <a:noFill/>
+          <a:extLst>
+            <a:ext uri="{909E8E84-426E-40DD-AFC4-6F175D3DCCD1}">
+              <a14:hiddenFill xmlns:a14="http://schemas.microsoft.com/office/drawing/2010/main">
+                <a:solidFill>
+                  <a:srgbClr val="FFFFFF"/>
+                </a:solidFill>
+              </a14:hiddenFill>
+            </a:ext>
+          </a:extLst>
+        </p:spPr>
+      </p:pic>
+      <p:sp>
+        <p:nvSpPr>
+          <p:cNvPr id="4" name="TextBox 3"/>
+          <p:cNvSpPr txBox="1"/>
+          <p:nvPr/>
+        </p:nvSpPr>
+        <p:spPr>
+          <a:xfrm>
+            <a:off x="228600" y="5486400"/>
+            <a:ext cx="8686799" cy="338554"/>
+          </a:xfrm>
+          <a:prstGeom prst="rect">
+            <a:avLst/>
+          </a:prstGeom>
+          <a:noFill/>
+        </p:spPr>
+        <p:txBody>
+          <a:bodyPr wrap="square" rtlCol="0">
+            <a:spAutoFit/>
+          </a:bodyPr>
+          <a:lstStyle/>
+          <a:p>
+            <a:pPr algn="ctr"/>
+            <a:r>
+              <a:rPr lang="en-US" sz="1600" dirty="0"/>
+              <a:t>http://cdn.collider.com/wp-content/uploads/2015/06/the-martian-movie-image-control-room.jpg</a:t>
+            </a:r>
+          </a:p>
+        </p:txBody>
+      </p:sp>
+    </p:spTree>
+    <p:extLst>
+      <p:ext uri="{BB962C8B-B14F-4D97-AF65-F5344CB8AC3E}">
+        <p14:creationId xmlns:p14="http://schemas.microsoft.com/office/powerpoint/2010/main" val="405317425"/>
+      </p:ext>
+    </p:extLst>
+  </p:cSld>
+  <p:clrMapOvr>
+    <a:masterClrMapping/>
+  </p:clrMapOvr>
+</p:sld>
+</file>
+
+<file path=ppt/slides/slide22.xml><?xml version="1.0" encoding="utf-8"?>
+<p:sld xmlns:a="http://schemas.openxmlformats.org/drawingml/2006/main" xmlns:r="http://schemas.openxmlformats.org/officeDocument/2006/relationships" xmlns:p="http://schemas.openxmlformats.org/presentationml/2006/main">
+  <p:cSld>
+    <p:spTree>
+      <p:nvGrpSpPr>
+        <p:cNvPr id="1" name=""/>
+        <p:cNvGrpSpPr/>
+        <p:nvPr/>
+      </p:nvGrpSpPr>
+      <p:grpSpPr>
+        <a:xfrm>
+          <a:off x="0" y="0"/>
+          <a:ext cx="0" cy="0"/>
+          <a:chOff x="0" y="0"/>
+          <a:chExt cx="0" cy="0"/>
+        </a:xfrm>
+      </p:grpSpPr>
+      <p:sp>
+        <p:nvSpPr>
+          <p:cNvPr id="2" name="Title 1"/>
+          <p:cNvSpPr>
+            <a:spLocks noGrp="1"/>
+          </p:cNvSpPr>
+          <p:nvPr>
+            <p:ph type="title"/>
+          </p:nvPr>
+        </p:nvSpPr>
+        <p:spPr/>
+        <p:txBody>
+          <a:bodyPr>
+            <a:normAutofit fontScale="90000"/>
+          </a:bodyPr>
+          <a:lstStyle/>
+          <a:p>
+            <a:r>
+              <a:rPr lang="en-US" dirty="0"/>
+              <a:t>Control Room (The Martian)</a:t>
+            </a:r>
+          </a:p>
+        </p:txBody>
+      </p:sp>
+      <p:sp>
+        <p:nvSpPr>
+          <p:cNvPr id="3" name="Slide Number Placeholder 2"/>
+          <p:cNvSpPr>
+            <a:spLocks noGrp="1"/>
+          </p:cNvSpPr>
+          <p:nvPr>
+            <p:ph type="sldNum" sz="quarter" idx="12"/>
+          </p:nvPr>
+        </p:nvSpPr>
+        <p:spPr/>
+        <p:txBody>
+          <a:bodyPr/>
+          <a:lstStyle/>
+          <a:p>
+            <a:fld id="{F1B1EB98-98E7-4A5A-BA8F-7513A9456E79}" type="slidenum">
+              <a:rPr lang="en-US" smtClean="0"/>
+              <a:pPr/>
+              <a:t>22</a:t>
+            </a:fld>
+            <a:endParaRPr lang="en-US" dirty="0"/>
+          </a:p>
+        </p:txBody>
+      </p:sp>
+      <p:sp>
+        <p:nvSpPr>
+          <p:cNvPr id="4" name="Rectangle 3"/>
+          <p:cNvSpPr/>
+          <p:nvPr/>
+        </p:nvSpPr>
+        <p:spPr>
+          <a:xfrm>
+            <a:off x="228600" y="5486400"/>
+            <a:ext cx="8686800" cy="276999"/>
+          </a:xfrm>
+          <a:prstGeom prst="rect">
+            <a:avLst/>
+          </a:prstGeom>
+        </p:spPr>
+        <p:txBody>
+          <a:bodyPr wrap="square">
+            <a:spAutoFit/>
+          </a:bodyPr>
+          <a:lstStyle/>
+          <a:p>
+            <a:pPr algn="ctr"/>
+            <a:r>
+              <a:rPr lang="en-US" sz="1200" dirty="0"/>
+              <a:t>http://3.bp.blogspot.com/-</a:t>
+            </a:r>
+            <a:r>
+              <a:rPr lang="en-US" sz="1200" dirty="0" smtClean="0"/>
+              <a:t>IOg7gg3VWsw/Vg4ZgZK3WNI/AAAAAAAABH8/MImWkRXLpsE/s1600/The_Martian_Mission_Control.jpg</a:t>
+            </a:r>
+            <a:endParaRPr lang="en-US" sz="1200" dirty="0"/>
+          </a:p>
+        </p:txBody>
+      </p:sp>
+      <p:pic>
+        <p:nvPicPr>
+          <p:cNvPr id="2050" name="Picture 2" descr="http://3.bp.blogspot.com/-IOg7gg3VWsw/Vg4ZgZK3WNI/AAAAAAAABH8/MImWkRXLpsE/s1600/The_Martian_Mission_Control.jpg"/>
+          <p:cNvPicPr>
+            <a:picLocks noChangeAspect="1" noChangeArrowheads="1"/>
+          </p:cNvPicPr>
+          <p:nvPr/>
+        </p:nvPicPr>
+        <p:blipFill>
+          <a:blip r:embed="rId2">
+            <a:extLst>
+              <a:ext uri="{28A0092B-C50C-407E-A947-70E740481C1C}">
+                <a14:useLocalDpi xmlns:a14="http://schemas.microsoft.com/office/drawing/2010/main" val="0"/>
+              </a:ext>
+            </a:extLst>
+          </a:blip>
+          <a:srcRect/>
+          <a:stretch>
+            <a:fillRect/>
+          </a:stretch>
+        </p:blipFill>
+        <p:spPr bwMode="auto">
+          <a:xfrm>
+            <a:off x="237744" y="914400"/>
+            <a:ext cx="8677656" cy="4578849"/>
+          </a:xfrm>
+          <a:prstGeom prst="rect">
+            <a:avLst/>
+          </a:prstGeom>
+          <a:noFill/>
+          <a:extLst>
+            <a:ext uri="{909E8E84-426E-40DD-AFC4-6F175D3DCCD1}">
+              <a14:hiddenFill xmlns:a14="http://schemas.microsoft.com/office/drawing/2010/main">
+                <a:solidFill>
+                  <a:srgbClr val="FFFFFF"/>
+                </a:solidFill>
+              </a14:hiddenFill>
+            </a:ext>
+          </a:extLst>
+        </p:spPr>
+      </p:pic>
+    </p:spTree>
+    <p:extLst>
+      <p:ext uri="{BB962C8B-B14F-4D97-AF65-F5344CB8AC3E}">
+        <p14:creationId xmlns:p14="http://schemas.microsoft.com/office/powerpoint/2010/main" val="3665104665"/>
+      </p:ext>
+    </p:extLst>
+  </p:cSld>
+  <p:clrMapOvr>
+    <a:masterClrMapping/>
+  </p:clrMapOvr>
+</p:sld>
+</file>
+
+<file path=ppt/slides/slide23.xml><?xml version="1.0" encoding="utf-8"?>
+<p:sld xmlns:a="http://schemas.openxmlformats.org/drawingml/2006/main" xmlns:r="http://schemas.openxmlformats.org/officeDocument/2006/relationships" xmlns:p="http://schemas.openxmlformats.org/presentationml/2006/main">
+  <p:cSld>
+    <p:spTree>
+      <p:nvGrpSpPr>
+        <p:cNvPr id="1" name=""/>
+        <p:cNvGrpSpPr/>
+        <p:nvPr/>
+      </p:nvGrpSpPr>
+      <p:grpSpPr>
+        <a:xfrm>
+          <a:off x="0" y="0"/>
+          <a:ext cx="0" cy="0"/>
+          <a:chOff x="0" y="0"/>
+          <a:chExt cx="0" cy="0"/>
+        </a:xfrm>
+      </p:grpSpPr>
+      <p:sp>
+        <p:nvSpPr>
+          <p:cNvPr id="2" name="Title 1"/>
+          <p:cNvSpPr>
+            <a:spLocks noGrp="1"/>
+          </p:cNvSpPr>
+          <p:nvPr>
+            <p:ph type="title"/>
+          </p:nvPr>
+        </p:nvSpPr>
+        <p:spPr/>
+        <p:txBody>
+          <a:bodyPr>
+            <a:normAutofit fontScale="90000"/>
+          </a:bodyPr>
+          <a:lstStyle/>
+          <a:p>
+            <a:r>
+              <a:rPr lang="en-US" dirty="0"/>
+              <a:t>Control Room (The Martian)</a:t>
+            </a:r>
+          </a:p>
+        </p:txBody>
+      </p:sp>
+      <p:sp>
+        <p:nvSpPr>
+          <p:cNvPr id="3" name="Slide Number Placeholder 2"/>
+          <p:cNvSpPr>
+            <a:spLocks noGrp="1"/>
+          </p:cNvSpPr>
+          <p:nvPr>
+            <p:ph type="sldNum" sz="quarter" idx="12"/>
+          </p:nvPr>
+        </p:nvSpPr>
+        <p:spPr/>
+        <p:txBody>
+          <a:bodyPr/>
+          <a:lstStyle/>
+          <a:p>
+            <a:fld id="{F1B1EB98-98E7-4A5A-BA8F-7513A9456E79}" type="slidenum">
+              <a:rPr lang="en-US" smtClean="0"/>
+              <a:pPr/>
+              <a:t>23</a:t>
+            </a:fld>
+            <a:endParaRPr lang="en-US" dirty="0"/>
+          </a:p>
+        </p:txBody>
+      </p:sp>
+      <p:pic>
+        <p:nvPicPr>
+          <p:cNvPr id="3074" name="Picture 2" descr="http://s3.foxmovies.com/foxmovies/production/films/104/images/gallery/martian-gallery18-gallery-image.jpg"/>
+          <p:cNvPicPr>
+            <a:picLocks noChangeAspect="1" noChangeArrowheads="1"/>
+          </p:cNvPicPr>
+          <p:nvPr/>
+        </p:nvPicPr>
+        <p:blipFill>
+          <a:blip r:embed="rId2">
+            <a:extLst>
+              <a:ext uri="{28A0092B-C50C-407E-A947-70E740481C1C}">
+                <a14:useLocalDpi xmlns:a14="http://schemas.microsoft.com/office/drawing/2010/main" val="0"/>
+              </a:ext>
+            </a:extLst>
+          </a:blip>
+          <a:srcRect/>
+          <a:stretch>
+            <a:fillRect/>
+          </a:stretch>
+        </p:blipFill>
+        <p:spPr bwMode="auto">
+          <a:xfrm>
+            <a:off x="228600" y="914400"/>
+            <a:ext cx="8677656" cy="4670679"/>
+          </a:xfrm>
+          <a:prstGeom prst="rect">
+            <a:avLst/>
+          </a:prstGeom>
+          <a:noFill/>
+          <a:extLst>
+            <a:ext uri="{909E8E84-426E-40DD-AFC4-6F175D3DCCD1}">
+              <a14:hiddenFill xmlns:a14="http://schemas.microsoft.com/office/drawing/2010/main">
+                <a:solidFill>
+                  <a:srgbClr val="FFFFFF"/>
+                </a:solidFill>
+              </a14:hiddenFill>
+            </a:ext>
+          </a:extLst>
+        </p:spPr>
+      </p:pic>
+      <p:sp>
+        <p:nvSpPr>
+          <p:cNvPr id="4" name="Rectangle 3"/>
+          <p:cNvSpPr/>
+          <p:nvPr/>
+        </p:nvSpPr>
+        <p:spPr>
+          <a:xfrm>
+            <a:off x="228600" y="5562600"/>
+            <a:ext cx="8686800" cy="307777"/>
+          </a:xfrm>
+          <a:prstGeom prst="rect">
+            <a:avLst/>
+          </a:prstGeom>
+        </p:spPr>
+        <p:txBody>
+          <a:bodyPr wrap="square">
+            <a:spAutoFit/>
+          </a:bodyPr>
+          <a:lstStyle/>
+          <a:p>
+            <a:pPr algn="ctr"/>
+            <a:r>
+              <a:rPr lang="en-US" sz="1400" dirty="0"/>
+              <a:t>http://s3.foxmovies.com/foxmovies/production/films/104/images/gallery/martian-gallery18-gallery-image.jpg</a:t>
+            </a:r>
+          </a:p>
+        </p:txBody>
+      </p:sp>
+    </p:spTree>
+    <p:extLst>
+      <p:ext uri="{BB962C8B-B14F-4D97-AF65-F5344CB8AC3E}">
+        <p14:creationId xmlns:p14="http://schemas.microsoft.com/office/powerpoint/2010/main" val="1824787362"/>
+      </p:ext>
+    </p:extLst>
+  </p:cSld>
+  <p:clrMapOvr>
+    <a:masterClrMapping/>
+  </p:clrMapOvr>
+</p:sld>
+</file>
+
+<file path=ppt/slides/slide24.xml><?xml version="1.0" encoding="utf-8"?>
+<p:sld xmlns:a="http://schemas.openxmlformats.org/drawingml/2006/main" xmlns:r="http://schemas.openxmlformats.org/officeDocument/2006/relationships" xmlns:p="http://schemas.openxmlformats.org/presentationml/2006/main">
+  <p:cSld>
+    <p:spTree>
+      <p:nvGrpSpPr>
+        <p:cNvPr id="1" name=""/>
+        <p:cNvGrpSpPr/>
+        <p:nvPr/>
+      </p:nvGrpSpPr>
+      <p:grpSpPr>
+        <a:xfrm>
+          <a:off x="0" y="0"/>
+          <a:ext cx="0" cy="0"/>
+          <a:chOff x="0" y="0"/>
+          <a:chExt cx="0" cy="0"/>
+        </a:xfrm>
+      </p:grpSpPr>
+      <p:sp>
+        <p:nvSpPr>
+          <p:cNvPr id="2" name="Title 1"/>
+          <p:cNvSpPr>
+            <a:spLocks noGrp="1"/>
+          </p:cNvSpPr>
+          <p:nvPr>
+            <p:ph type="title"/>
+          </p:nvPr>
+        </p:nvSpPr>
+        <p:spPr/>
+        <p:txBody>
+          <a:bodyPr>
+            <a:normAutofit fontScale="90000"/>
+          </a:bodyPr>
+          <a:lstStyle/>
+          <a:p>
+            <a:r>
+              <a:rPr lang="en-US" dirty="0" smtClean="0"/>
+              <a:t>NASA Control Room</a:t>
+            </a:r>
+            <a:endParaRPr lang="en-US" dirty="0"/>
+          </a:p>
+        </p:txBody>
+      </p:sp>
+      <p:sp>
+        <p:nvSpPr>
+          <p:cNvPr id="3" name="Slide Number Placeholder 2"/>
+          <p:cNvSpPr>
+            <a:spLocks noGrp="1"/>
+          </p:cNvSpPr>
+          <p:nvPr>
+            <p:ph type="sldNum" sz="quarter" idx="12"/>
+          </p:nvPr>
+        </p:nvSpPr>
+        <p:spPr/>
+        <p:txBody>
+          <a:bodyPr/>
+          <a:lstStyle/>
+          <a:p>
+            <a:fld id="{F1B1EB98-98E7-4A5A-BA8F-7513A9456E79}" type="slidenum">
+              <a:rPr lang="en-US" smtClean="0"/>
+              <a:pPr/>
+              <a:t>24</a:t>
+            </a:fld>
+            <a:endParaRPr lang="en-US" dirty="0"/>
+          </a:p>
+        </p:txBody>
+      </p:sp>
+      <p:pic>
+        <p:nvPicPr>
+          <p:cNvPr id="4098" name="Picture 2" descr="https://upload.wikimedia.org/wikipedia/commons/f/fd/STS-128_MCC_space_station_flight_control_room.jpg"/>
+          <p:cNvPicPr>
+            <a:picLocks noChangeAspect="1" noChangeArrowheads="1"/>
+          </p:cNvPicPr>
+          <p:nvPr/>
+        </p:nvPicPr>
+        <p:blipFill rotWithShape="1">
+          <a:blip r:embed="rId2" cstate="print">
+            <a:extLst>
+              <a:ext uri="{28A0092B-C50C-407E-A947-70E740481C1C}">
+                <a14:useLocalDpi xmlns:a14="http://schemas.microsoft.com/office/drawing/2010/main" val="0"/>
+              </a:ext>
+            </a:extLst>
+          </a:blip>
+          <a:srcRect b="9311"/>
+          <a:stretch/>
+        </p:blipFill>
+        <p:spPr bwMode="auto">
+          <a:xfrm>
+            <a:off x="228600" y="930704"/>
+            <a:ext cx="8677656" cy="5237184"/>
+          </a:xfrm>
+          <a:prstGeom prst="rect">
+            <a:avLst/>
+          </a:prstGeom>
+          <a:noFill/>
+          <a:extLst>
+            <a:ext uri="{909E8E84-426E-40DD-AFC4-6F175D3DCCD1}">
+              <a14:hiddenFill xmlns:a14="http://schemas.microsoft.com/office/drawing/2010/main">
+                <a:solidFill>
+                  <a:srgbClr val="FFFFFF"/>
+                </a:solidFill>
+              </a14:hiddenFill>
+            </a:ext>
+          </a:extLst>
+        </p:spPr>
+      </p:pic>
+      <p:sp>
+        <p:nvSpPr>
+          <p:cNvPr id="4" name="Rectangle 3"/>
+          <p:cNvSpPr/>
+          <p:nvPr/>
+        </p:nvSpPr>
+        <p:spPr>
+          <a:xfrm>
+            <a:off x="228600" y="6169223"/>
+            <a:ext cx="8686800" cy="307777"/>
+          </a:xfrm>
+          <a:prstGeom prst="rect">
+            <a:avLst/>
+          </a:prstGeom>
+        </p:spPr>
+        <p:txBody>
+          <a:bodyPr wrap="square">
+            <a:spAutoFit/>
+          </a:bodyPr>
+          <a:lstStyle/>
+          <a:p>
+            <a:pPr algn="ctr"/>
+            <a:r>
+              <a:rPr lang="en-US" sz="1400" dirty="0"/>
+              <a:t>https://upload.wikimedia.org/wikipedia/commons/f/fd/STS-128_MCC_space_station_flight_control_room.jpg</a:t>
+            </a:r>
+          </a:p>
+        </p:txBody>
+      </p:sp>
+    </p:spTree>
+    <p:extLst>
+      <p:ext uri="{BB962C8B-B14F-4D97-AF65-F5344CB8AC3E}">
+        <p14:creationId xmlns:p14="http://schemas.microsoft.com/office/powerpoint/2010/main" val="2451054303"/>
+      </p:ext>
+    </p:extLst>
+  </p:cSld>
+  <p:clrMapOvr>
+    <a:masterClrMapping/>
+  </p:clrMapOvr>
+</p:sld>
+</file>
+
+<file path=ppt/slides/slide25.xml><?xml version="1.0" encoding="utf-8"?>
+<p:sld xmlns:a="http://schemas.openxmlformats.org/drawingml/2006/main" xmlns:r="http://schemas.openxmlformats.org/officeDocument/2006/relationships" xmlns:p="http://schemas.openxmlformats.org/presentationml/2006/main">
+  <p:cSld>
+    <p:spTree>
+      <p:nvGrpSpPr>
+        <p:cNvPr id="1" name=""/>
+        <p:cNvGrpSpPr/>
+        <p:nvPr/>
+      </p:nvGrpSpPr>
+      <p:grpSpPr>
+        <a:xfrm>
+          <a:off x="0" y="0"/>
+          <a:ext cx="0" cy="0"/>
+          <a:chOff x="0" y="0"/>
+          <a:chExt cx="0" cy="0"/>
+        </a:xfrm>
+      </p:grpSpPr>
+      <p:sp>
+        <p:nvSpPr>
+          <p:cNvPr id="2" name="Title 1"/>
+          <p:cNvSpPr>
+            <a:spLocks noGrp="1"/>
+          </p:cNvSpPr>
+          <p:nvPr>
+            <p:ph type="title"/>
+          </p:nvPr>
+        </p:nvSpPr>
+        <p:spPr/>
+        <p:txBody>
+          <a:bodyPr>
+            <a:normAutofit fontScale="90000"/>
+          </a:bodyPr>
+          <a:lstStyle/>
+          <a:p>
+            <a:r>
+              <a:rPr lang="en-US" dirty="0"/>
+              <a:t>NASA Control Room</a:t>
+            </a:r>
+          </a:p>
+        </p:txBody>
+      </p:sp>
+      <p:sp>
+        <p:nvSpPr>
+          <p:cNvPr id="3" name="Slide Number Placeholder 2"/>
+          <p:cNvSpPr>
+            <a:spLocks noGrp="1"/>
+          </p:cNvSpPr>
+          <p:nvPr>
+            <p:ph type="sldNum" sz="quarter" idx="12"/>
+          </p:nvPr>
+        </p:nvSpPr>
+        <p:spPr/>
+        <p:txBody>
+          <a:bodyPr/>
+          <a:lstStyle/>
+          <a:p>
+            <a:fld id="{F1B1EB98-98E7-4A5A-BA8F-7513A9456E79}" type="slidenum">
+              <a:rPr lang="en-US" smtClean="0"/>
+              <a:pPr/>
+              <a:t>25</a:t>
+            </a:fld>
+            <a:endParaRPr lang="en-US" dirty="0"/>
+          </a:p>
+        </p:txBody>
+      </p:sp>
+      <p:pic>
+        <p:nvPicPr>
+          <p:cNvPr id="5122" name="Picture 2" descr="http://www.nasa.gov/images/content/652997main_jsc2012e054285_1600_946-710.jpg"/>
+          <p:cNvPicPr>
+            <a:picLocks noChangeAspect="1" noChangeArrowheads="1"/>
+          </p:cNvPicPr>
+          <p:nvPr/>
+        </p:nvPicPr>
+        <p:blipFill rotWithShape="1">
+          <a:blip r:embed="rId2">
+            <a:extLst>
+              <a:ext uri="{28A0092B-C50C-407E-A947-70E740481C1C}">
+                <a14:useLocalDpi xmlns:a14="http://schemas.microsoft.com/office/drawing/2010/main" val="0"/>
+              </a:ext>
+            </a:extLst>
+          </a:blip>
+          <a:srcRect b="30462"/>
+          <a:stretch/>
+        </p:blipFill>
+        <p:spPr bwMode="auto">
+          <a:xfrm>
+            <a:off x="228600" y="926068"/>
+            <a:ext cx="8677656" cy="4528868"/>
+          </a:xfrm>
+          <a:prstGeom prst="rect">
+            <a:avLst/>
+          </a:prstGeom>
+          <a:noFill/>
+          <a:extLst>
+            <a:ext uri="{909E8E84-426E-40DD-AFC4-6F175D3DCCD1}">
+              <a14:hiddenFill xmlns:a14="http://schemas.microsoft.com/office/drawing/2010/main">
+                <a:solidFill>
+                  <a:srgbClr val="FFFFFF"/>
+                </a:solidFill>
+              </a14:hiddenFill>
+            </a:ext>
+          </a:extLst>
+        </p:spPr>
+      </p:pic>
+      <p:sp>
+        <p:nvSpPr>
+          <p:cNvPr id="4" name="Rectangle 3"/>
+          <p:cNvSpPr/>
+          <p:nvPr/>
+        </p:nvSpPr>
+        <p:spPr>
+          <a:xfrm>
+            <a:off x="228600" y="5421868"/>
+            <a:ext cx="8686800" cy="369332"/>
+          </a:xfrm>
+          <a:prstGeom prst="rect">
+            <a:avLst/>
+          </a:prstGeom>
+        </p:spPr>
+        <p:txBody>
+          <a:bodyPr wrap="square">
+            <a:spAutoFit/>
+          </a:bodyPr>
+          <a:lstStyle/>
+          <a:p>
+            <a:pPr algn="ctr"/>
+            <a:r>
+              <a:rPr lang="en-US" dirty="0"/>
+              <a:t>http://www.nasa.gov/images/content/652997main_jsc2012e054285_1600_946-710.jpg</a:t>
+            </a:r>
+          </a:p>
+        </p:txBody>
+      </p:sp>
+    </p:spTree>
+    <p:extLst>
+      <p:ext uri="{BB962C8B-B14F-4D97-AF65-F5344CB8AC3E}">
+        <p14:creationId xmlns:p14="http://schemas.microsoft.com/office/powerpoint/2010/main" val="3123038276"/>
+      </p:ext>
+    </p:extLst>
+  </p:cSld>
+  <p:clrMapOvr>
+    <a:masterClrMapping/>
+  </p:clrMapOvr>
+</p:sld>
+</file>
+
+<file path=ppt/slides/slide26.xml><?xml version="1.0" encoding="utf-8"?>
+<p:sld xmlns:a="http://schemas.openxmlformats.org/drawingml/2006/main" xmlns:r="http://schemas.openxmlformats.org/officeDocument/2006/relationships" xmlns:p="http://schemas.openxmlformats.org/presentationml/2006/main">
+  <p:cSld>
+    <p:spTree>
+      <p:nvGrpSpPr>
+        <p:cNvPr id="1" name=""/>
+        <p:cNvGrpSpPr/>
+        <p:nvPr/>
+      </p:nvGrpSpPr>
+      <p:grpSpPr>
+        <a:xfrm>
+          <a:off x="0" y="0"/>
+          <a:ext cx="0" cy="0"/>
+          <a:chOff x="0" y="0"/>
+          <a:chExt cx="0" cy="0"/>
+        </a:xfrm>
+      </p:grpSpPr>
+      <p:sp>
+        <p:nvSpPr>
+          <p:cNvPr id="2" name="Title 1"/>
+          <p:cNvSpPr>
+            <a:spLocks noGrp="1"/>
+          </p:cNvSpPr>
+          <p:nvPr>
+            <p:ph type="title"/>
+          </p:nvPr>
+        </p:nvSpPr>
+        <p:spPr/>
+        <p:txBody>
+          <a:bodyPr>
+            <a:normAutofit fontScale="90000"/>
+          </a:bodyPr>
+          <a:lstStyle/>
+          <a:p>
+            <a:endParaRPr lang="en-US"/>
+          </a:p>
+        </p:txBody>
+      </p:sp>
+      <p:sp>
+        <p:nvSpPr>
+          <p:cNvPr id="3" name="Slide Number Placeholder 2"/>
+          <p:cNvSpPr>
+            <a:spLocks noGrp="1"/>
+          </p:cNvSpPr>
+          <p:nvPr>
+            <p:ph type="sldNum" sz="quarter" idx="12"/>
+          </p:nvPr>
+        </p:nvSpPr>
+        <p:spPr/>
+        <p:txBody>
+          <a:bodyPr/>
+          <a:lstStyle/>
+          <a:p>
+            <a:fld id="{F1B1EB98-98E7-4A5A-BA8F-7513A9456E79}" type="slidenum">
+              <a:rPr lang="en-US" smtClean="0"/>
+              <a:pPr/>
+              <a:t>26</a:t>
+            </a:fld>
+            <a:endParaRPr lang="en-US" dirty="0"/>
+          </a:p>
+        </p:txBody>
+      </p:sp>
+      <p:sp>
+        <p:nvSpPr>
+          <p:cNvPr id="4" name="Rectangle 3"/>
+          <p:cNvSpPr/>
+          <p:nvPr/>
+        </p:nvSpPr>
+        <p:spPr>
+          <a:xfrm>
+            <a:off x="228600" y="4038600"/>
+            <a:ext cx="8686800" cy="276999"/>
+          </a:xfrm>
+          <a:prstGeom prst="rect">
+            <a:avLst/>
+          </a:prstGeom>
+        </p:spPr>
+        <p:txBody>
+          <a:bodyPr wrap="square">
+            <a:spAutoFit/>
+          </a:bodyPr>
+          <a:lstStyle/>
+          <a:p>
+            <a:pPr algn="ctr"/>
+            <a:r>
+              <a:rPr lang="en-US" sz="1200" dirty="0"/>
+              <a:t>http://spacefellowship.com/wp-content/uploads/2012/08/ESOC-MainControlRoom-13x19cm-08112011-JMai-4822.jpg</a:t>
+            </a:r>
+          </a:p>
+        </p:txBody>
+      </p:sp>
+      <p:pic>
+        <p:nvPicPr>
+          <p:cNvPr id="6146" name="Picture 2" descr="http://spacefellowship.com/wp-content/uploads/2012/08/ESOC-MainControlRoom-13x19cm-08112011-JMai-4822.jpg"/>
+          <p:cNvPicPr>
+            <a:picLocks noChangeAspect="1" noChangeArrowheads="1"/>
+          </p:cNvPicPr>
+          <p:nvPr/>
+        </p:nvPicPr>
+        <p:blipFill rotWithShape="1">
+          <a:blip r:embed="rId2">
+            <a:extLst>
+              <a:ext uri="{28A0092B-C50C-407E-A947-70E740481C1C}">
+                <a14:useLocalDpi xmlns:a14="http://schemas.microsoft.com/office/drawing/2010/main" val="0"/>
+              </a:ext>
+            </a:extLst>
+          </a:blip>
+          <a:srcRect t="17041" b="29155"/>
+          <a:stretch/>
+        </p:blipFill>
+        <p:spPr bwMode="auto">
+          <a:xfrm>
+            <a:off x="228600" y="924464"/>
+            <a:ext cx="8677656" cy="3114136"/>
+          </a:xfrm>
+          <a:prstGeom prst="rect">
+            <a:avLst/>
+          </a:prstGeom>
+          <a:noFill/>
+          <a:extLst>
+            <a:ext uri="{909E8E84-426E-40DD-AFC4-6F175D3DCCD1}">
+              <a14:hiddenFill xmlns:a14="http://schemas.microsoft.com/office/drawing/2010/main">
+                <a:solidFill>
+                  <a:srgbClr val="FFFFFF"/>
+                </a:solidFill>
+              </a14:hiddenFill>
+            </a:ext>
+          </a:extLst>
+        </p:spPr>
+      </p:pic>
+    </p:spTree>
+    <p:extLst>
+      <p:ext uri="{BB962C8B-B14F-4D97-AF65-F5344CB8AC3E}">
+        <p14:creationId xmlns:p14="http://schemas.microsoft.com/office/powerpoint/2010/main" val="2793129726"/>
+      </p:ext>
+    </p:extLst>
+  </p:cSld>
+  <p:clrMapOvr>
+    <a:masterClrMapping/>
+  </p:clrMapOvr>
+</p:sld>
+</file>
+
+<file path=ppt/slides/slide27.xml><?xml version="1.0" encoding="utf-8"?>
+<p:sld xmlns:a="http://schemas.openxmlformats.org/drawingml/2006/main" xmlns:r="http://schemas.openxmlformats.org/officeDocument/2006/relationships" xmlns:p="http://schemas.openxmlformats.org/presentationml/2006/main">
+  <p:cSld>
+    <p:spTree>
+      <p:nvGrpSpPr>
+        <p:cNvPr id="1" name=""/>
+        <p:cNvGrpSpPr/>
+        <p:nvPr/>
+      </p:nvGrpSpPr>
+      <p:grpSpPr>
+        <a:xfrm>
+          <a:off x="0" y="0"/>
+          <a:ext cx="0" cy="0"/>
+          <a:chOff x="0" y="0"/>
+          <a:chExt cx="0" cy="0"/>
+        </a:xfrm>
+      </p:grpSpPr>
+      <p:sp>
+        <p:nvSpPr>
+          <p:cNvPr id="2" name="Title 1"/>
+          <p:cNvSpPr>
+            <a:spLocks noGrp="1"/>
+          </p:cNvSpPr>
+          <p:nvPr>
+            <p:ph type="title"/>
+          </p:nvPr>
+        </p:nvSpPr>
+        <p:spPr/>
+        <p:txBody>
+          <a:bodyPr>
+            <a:normAutofit fontScale="90000"/>
+          </a:bodyPr>
+          <a:lstStyle/>
+          <a:p>
+            <a:endParaRPr lang="en-US"/>
+          </a:p>
+        </p:txBody>
+      </p:sp>
+      <p:sp>
+        <p:nvSpPr>
+          <p:cNvPr id="3" name="Slide Number Placeholder 2"/>
+          <p:cNvSpPr>
+            <a:spLocks noGrp="1"/>
+          </p:cNvSpPr>
+          <p:nvPr>
+            <p:ph type="sldNum" sz="quarter" idx="12"/>
+          </p:nvPr>
+        </p:nvSpPr>
+        <p:spPr/>
+        <p:txBody>
+          <a:bodyPr/>
+          <a:lstStyle/>
+          <a:p>
+            <a:fld id="{F1B1EB98-98E7-4A5A-BA8F-7513A9456E79}" type="slidenum">
+              <a:rPr lang="en-US" smtClean="0"/>
+              <a:pPr/>
+              <a:t>27</a:t>
+            </a:fld>
+            <a:endParaRPr lang="en-US" dirty="0"/>
+          </a:p>
+        </p:txBody>
+      </p:sp>
+      <p:pic>
+        <p:nvPicPr>
+          <p:cNvPr id="7170" name="Picture 2" descr="https://www.gnu.org/software/gsegrafix/figures/window.png"/>
+          <p:cNvPicPr>
+            <a:picLocks noChangeAspect="1" noChangeArrowheads="1"/>
+          </p:cNvPicPr>
+          <p:nvPr/>
+        </p:nvPicPr>
+        <p:blipFill>
+          <a:blip r:embed="rId2">
+            <a:extLst>
+              <a:ext uri="{28A0092B-C50C-407E-A947-70E740481C1C}">
+                <a14:useLocalDpi xmlns:a14="http://schemas.microsoft.com/office/drawing/2010/main" val="0"/>
+              </a:ext>
+            </a:extLst>
+          </a:blip>
+          <a:srcRect/>
+          <a:stretch>
+            <a:fillRect/>
+          </a:stretch>
+        </p:blipFill>
+        <p:spPr bwMode="auto">
+          <a:xfrm>
+            <a:off x="1600200" y="838200"/>
+            <a:ext cx="6172200" cy="4800601"/>
+          </a:xfrm>
+          <a:prstGeom prst="rect">
+            <a:avLst/>
+          </a:prstGeom>
+          <a:noFill/>
+          <a:extLst>
+            <a:ext uri="{909E8E84-426E-40DD-AFC4-6F175D3DCCD1}">
+              <a14:hiddenFill xmlns:a14="http://schemas.microsoft.com/office/drawing/2010/main">
+                <a:solidFill>
+                  <a:srgbClr val="FFFFFF"/>
+                </a:solidFill>
+              </a14:hiddenFill>
+            </a:ext>
+          </a:extLst>
+        </p:spPr>
+      </p:pic>
+    </p:spTree>
+    <p:extLst>
+      <p:ext uri="{BB962C8B-B14F-4D97-AF65-F5344CB8AC3E}">
+        <p14:creationId xmlns:p14="http://schemas.microsoft.com/office/powerpoint/2010/main" val="3451491691"/>
       </p:ext>
     </p:extLst>
   </p:cSld>
@@ -11592,10 +13227,6 @@
           <a:bodyPr/>
           <a:lstStyle/>
           <a:p>
-            <a:r>
-              <a:rPr lang="en-US" smtClean="0"/>
-              <a:t>Page </a:t>
-            </a:r>
             <a:fld id="{F1B1EB98-98E7-4A5A-BA8F-7513A9456E79}" type="slidenum">
               <a:rPr lang="en-US" smtClean="0"/>
               <a:pPr/>
@@ -12518,10 +14149,6 @@
           <a:bodyPr/>
           <a:lstStyle/>
           <a:p>
-            <a:r>
-              <a:rPr lang="en-US" smtClean="0"/>
-              <a:t>Page </a:t>
-            </a:r>
             <a:fld id="{F1B1EB98-98E7-4A5A-BA8F-7513A9456E79}" type="slidenum">
               <a:rPr lang="en-US" smtClean="0"/>
               <a:pPr/>
@@ -12997,10 +14624,6 @@
           <a:bodyPr/>
           <a:lstStyle/>
           <a:p>
-            <a:r>
-              <a:rPr lang="en-US" smtClean="0"/>
-              <a:t>Page </a:t>
-            </a:r>
             <a:fld id="{F1B1EB98-98E7-4A5A-BA8F-7513A9456E79}" type="slidenum">
               <a:rPr lang="en-US" smtClean="0"/>
               <a:pPr/>
@@ -13712,10 +15335,6 @@
           <a:bodyPr/>
           <a:lstStyle/>
           <a:p>
-            <a:r>
-              <a:rPr lang="en-US" smtClean="0"/>
-              <a:t>Page </a:t>
-            </a:r>
             <a:fld id="{F1B1EB98-98E7-4A5A-BA8F-7513A9456E79}" type="slidenum">
               <a:rPr lang="en-US" smtClean="0"/>
               <a:pPr/>
@@ -13795,10 +15414,6 @@
           <a:bodyPr/>
           <a:lstStyle/>
           <a:p>
-            <a:r>
-              <a:rPr lang="en-US" smtClean="0"/>
-              <a:t>Page </a:t>
-            </a:r>
             <a:fld id="{F1B1EB98-98E7-4A5A-BA8F-7513A9456E79}" type="slidenum">
               <a:rPr lang="en-US" smtClean="0"/>
               <a:pPr/>
@@ -14670,10 +16285,6 @@
           <a:bodyPr/>
           <a:lstStyle/>
           <a:p>
-            <a:r>
-              <a:rPr lang="en-US" smtClean="0"/>
-              <a:t>Page </a:t>
-            </a:r>
             <a:fld id="{F1B1EB98-98E7-4A5A-BA8F-7513A9456E79}" type="slidenum">
               <a:rPr lang="en-US" smtClean="0"/>
               <a:pPr/>
@@ -17152,10 +18763,6 @@
           <a:bodyPr/>
           <a:lstStyle/>
           <a:p>
-            <a:r>
-              <a:rPr lang="en-US" smtClean="0"/>
-              <a:t>Page </a:t>
-            </a:r>
             <a:fld id="{F1B1EB98-98E7-4A5A-BA8F-7513A9456E79}" type="slidenum">
               <a:rPr lang="en-US" smtClean="0"/>
               <a:pPr/>

</xml_diff>

<commit_message>
Added ability to detect percent actually updated in ITaskView.
</commit_message>
<xml_diff>
--- a/java/JChartLib/docs/ui_framing.pptx
+++ b/java/JChartLib/docs/ui_framing.pptx
@@ -10231,7 +10231,11 @@
           </a:bodyPr>
           <a:lstStyle/>
           <a:p>
-            <a:endParaRPr lang="en-US"/>
+            <a:r>
+              <a:rPr lang="en-US" dirty="0" smtClean="0"/>
+              <a:t>Text</a:t>
+            </a:r>
+            <a:endParaRPr lang="en-US" dirty="0"/>
           </a:p>
         </p:txBody>
       </p:sp>
@@ -10450,7 +10454,7 @@
           <a:p>
             <a:pPr lvl="1"/>
             <a:r>
-              <a:rPr lang="en-US" smtClean="0"/>
+              <a:rPr lang="en-US" dirty="0" err="1" smtClean="0"/>
               <a:t>drawBaseLine:boolean</a:t>
             </a:r>
             <a:endParaRPr lang="en-US" dirty="0" smtClean="0"/>
@@ -10459,7 +10463,7 @@
             <a:pPr lvl="1"/>
             <a:r>
               <a:rPr lang="en-US" dirty="0" err="1" smtClean="0"/>
-              <a:t>drawTickLine:boolean</a:t>
+              <a:t>drawTickLines:boolean</a:t>
             </a:r>
             <a:endParaRPr lang="en-US" dirty="0" smtClean="0"/>
           </a:p>
@@ -11633,7 +11637,7 @@
         <p:spPr/>
         <p:txBody>
           <a:bodyPr>
-            <a:normAutofit fontScale="85000" lnSpcReduction="20000"/>
+            <a:normAutofit fontScale="77500" lnSpcReduction="20000"/>
           </a:bodyPr>
           <a:lstStyle/>
           <a:p>
@@ -11647,6 +11651,20 @@
             <a:r>
               <a:rPr lang="en-US" dirty="0" err="1" smtClean="0"/>
               <a:t>gridStyle:LineStyle</a:t>
+            </a:r>
+            <a:endParaRPr lang="en-US" dirty="0" smtClean="0"/>
+          </a:p>
+          <a:p>
+            <a:r>
+              <a:rPr lang="en-US" dirty="0" err="1" smtClean="0"/>
+              <a:t>minorLines:boolean</a:t>
+            </a:r>
+            <a:endParaRPr lang="en-US" dirty="0" smtClean="0"/>
+          </a:p>
+          <a:p>
+            <a:r>
+              <a:rPr lang="en-US" dirty="0" err="1" smtClean="0"/>
+              <a:t>minorLineStyle:LineStyle</a:t>
             </a:r>
             <a:endParaRPr lang="en-US" dirty="0" smtClean="0"/>
           </a:p>

</xml_diff>